<commit_message>
Updated for THAT Conference 2019
</commit_message>
<xml_diff>
--- a/Speaker Slides/SpeakerSlides.pptx
+++ b/Speaker Slides/SpeakerSlides.pptx
@@ -200,7 +200,7 @@
           <a:p>
             <a:fld id="{68394F06-F341-0D43-9A7A-E252ACA98CBC}" type="datetimeFigureOut">
               <a:rPr lang="en-US" smtClean="0"/>
-              <a:t>7/20/18</a:t>
+              <a:t>7/19/19</a:t>
             </a:fld>
             <a:endParaRPr lang="en-US"/>
           </a:p>
@@ -511,6 +511,90 @@
           <a:bodyPr/>
           <a:lstStyle/>
           <a:p>
+            <a:endParaRPr lang="en-US" dirty="0"/>
+          </a:p>
+        </p:txBody>
+      </p:sp>
+      <p:sp>
+        <p:nvSpPr>
+          <p:cNvPr id="4" name="Slide Number Placeholder 3"/>
+          <p:cNvSpPr>
+            <a:spLocks noGrp="1"/>
+          </p:cNvSpPr>
+          <p:nvPr>
+            <p:ph type="sldNum" sz="quarter" idx="5"/>
+          </p:nvPr>
+        </p:nvSpPr>
+        <p:spPr/>
+        <p:txBody>
+          <a:bodyPr/>
+          <a:lstStyle/>
+          <a:p>
+            <a:fld id="{470171FF-96A1-7D4A-AA25-C4377DE34A9D}" type="slidenum">
+              <a:rPr lang="en-US" smtClean="0"/>
+              <a:t>1</a:t>
+            </a:fld>
+            <a:endParaRPr lang="en-US"/>
+          </a:p>
+        </p:txBody>
+      </p:sp>
+    </p:spTree>
+    <p:extLst>
+      <p:ext uri="{BB962C8B-B14F-4D97-AF65-F5344CB8AC3E}">
+        <p14:creationId xmlns:p14="http://schemas.microsoft.com/office/powerpoint/2010/main" val="1325557756"/>
+      </p:ext>
+    </p:extLst>
+  </p:cSld>
+  <p:clrMapOvr>
+    <a:masterClrMapping/>
+  </p:clrMapOvr>
+</p:notes>
+</file>
+
+<file path=ppt/notesSlides/notesSlide2.xml><?xml version="1.0" encoding="utf-8"?>
+<p:notes xmlns:a="http://schemas.openxmlformats.org/drawingml/2006/main" xmlns:r="http://schemas.openxmlformats.org/officeDocument/2006/relationships" xmlns:p="http://schemas.openxmlformats.org/presentationml/2006/main">
+  <p:cSld>
+    <p:spTree>
+      <p:nvGrpSpPr>
+        <p:cNvPr id="1" name=""/>
+        <p:cNvGrpSpPr/>
+        <p:nvPr/>
+      </p:nvGrpSpPr>
+      <p:grpSpPr>
+        <a:xfrm>
+          <a:off x="0" y="0"/>
+          <a:ext cx="0" cy="0"/>
+          <a:chOff x="0" y="0"/>
+          <a:chExt cx="0" cy="0"/>
+        </a:xfrm>
+      </p:grpSpPr>
+      <p:sp>
+        <p:nvSpPr>
+          <p:cNvPr id="2" name="Slide Image Placeholder 1"/>
+          <p:cNvSpPr>
+            <a:spLocks noGrp="1" noRot="1" noChangeAspect="1"/>
+          </p:cNvSpPr>
+          <p:nvPr>
+            <p:ph type="sldImg"/>
+          </p:nvPr>
+        </p:nvSpPr>
+        <p:spPr/>
+      </p:sp>
+      <p:sp>
+        <p:nvSpPr>
+          <p:cNvPr id="3" name="Notes Placeholder 2"/>
+          <p:cNvSpPr>
+            <a:spLocks noGrp="1"/>
+          </p:cNvSpPr>
+          <p:nvPr>
+            <p:ph type="body" idx="1"/>
+          </p:nvPr>
+        </p:nvSpPr>
+        <p:spPr/>
+        <p:txBody>
+          <a:bodyPr/>
+          <a:lstStyle/>
+          <a:p>
             <a:endParaRPr lang="en-US"/>
           </a:p>
         </p:txBody>
@@ -680,7 +764,7 @@
           <a:p>
             <a:fld id="{1906F911-B8F3-1042-B226-54911C0C3F55}" type="datetimeFigureOut">
               <a:rPr lang="en-US" smtClean="0"/>
-              <a:t>7/20/18</a:t>
+              <a:t>7/19/19</a:t>
             </a:fld>
             <a:endParaRPr lang="en-US"/>
           </a:p>
@@ -848,7 +932,7 @@
           <a:p>
             <a:fld id="{1906F911-B8F3-1042-B226-54911C0C3F55}" type="datetimeFigureOut">
               <a:rPr lang="en-US" smtClean="0"/>
-              <a:t>7/20/18</a:t>
+              <a:t>7/19/19</a:t>
             </a:fld>
             <a:endParaRPr lang="en-US"/>
           </a:p>
@@ -1026,7 +1110,7 @@
           <a:p>
             <a:fld id="{1906F911-B8F3-1042-B226-54911C0C3F55}" type="datetimeFigureOut">
               <a:rPr lang="en-US" smtClean="0"/>
-              <a:t>7/20/18</a:t>
+              <a:t>7/19/19</a:t>
             </a:fld>
             <a:endParaRPr lang="en-US"/>
           </a:p>
@@ -1194,7 +1278,7 @@
           <a:p>
             <a:fld id="{1906F911-B8F3-1042-B226-54911C0C3F55}" type="datetimeFigureOut">
               <a:rPr lang="en-US" smtClean="0"/>
-              <a:t>7/20/18</a:t>
+              <a:t>7/19/19</a:t>
             </a:fld>
             <a:endParaRPr lang="en-US"/>
           </a:p>
@@ -1439,7 +1523,7 @@
           <a:p>
             <a:fld id="{1906F911-B8F3-1042-B226-54911C0C3F55}" type="datetimeFigureOut">
               <a:rPr lang="en-US" smtClean="0"/>
-              <a:t>7/20/18</a:t>
+              <a:t>7/19/19</a:t>
             </a:fld>
             <a:endParaRPr lang="en-US"/>
           </a:p>
@@ -1668,7 +1752,7 @@
           <a:p>
             <a:fld id="{1906F911-B8F3-1042-B226-54911C0C3F55}" type="datetimeFigureOut">
               <a:rPr lang="en-US" smtClean="0"/>
-              <a:t>7/20/18</a:t>
+              <a:t>7/19/19</a:t>
             </a:fld>
             <a:endParaRPr lang="en-US"/>
           </a:p>
@@ -2032,7 +2116,7 @@
           <a:p>
             <a:fld id="{1906F911-B8F3-1042-B226-54911C0C3F55}" type="datetimeFigureOut">
               <a:rPr lang="en-US" smtClean="0"/>
-              <a:t>7/20/18</a:t>
+              <a:t>7/19/19</a:t>
             </a:fld>
             <a:endParaRPr lang="en-US"/>
           </a:p>
@@ -2149,7 +2233,7 @@
           <a:p>
             <a:fld id="{1906F911-B8F3-1042-B226-54911C0C3F55}" type="datetimeFigureOut">
               <a:rPr lang="en-US" smtClean="0"/>
-              <a:t>7/20/18</a:t>
+              <a:t>7/19/19</a:t>
             </a:fld>
             <a:endParaRPr lang="en-US"/>
           </a:p>
@@ -2244,7 +2328,7 @@
           <a:p>
             <a:fld id="{1906F911-B8F3-1042-B226-54911C0C3F55}" type="datetimeFigureOut">
               <a:rPr lang="en-US" smtClean="0"/>
-              <a:t>7/20/18</a:t>
+              <a:t>7/19/19</a:t>
             </a:fld>
             <a:endParaRPr lang="en-US"/>
           </a:p>
@@ -2519,7 +2603,7 @@
           <a:p>
             <a:fld id="{1906F911-B8F3-1042-B226-54911C0C3F55}" type="datetimeFigureOut">
               <a:rPr lang="en-US" smtClean="0"/>
-              <a:t>7/20/18</a:t>
+              <a:t>7/19/19</a:t>
             </a:fld>
             <a:endParaRPr lang="en-US"/>
           </a:p>
@@ -2771,7 +2855,7 @@
           <a:p>
             <a:fld id="{1906F911-B8F3-1042-B226-54911C0C3F55}" type="datetimeFigureOut">
               <a:rPr lang="en-US" smtClean="0"/>
-              <a:t>7/20/18</a:t>
+              <a:t>7/19/19</a:t>
             </a:fld>
             <a:endParaRPr lang="en-US"/>
           </a:p>
@@ -2982,7 +3066,7 @@
           <a:p>
             <a:fld id="{1906F911-B8F3-1042-B226-54911C0C3F55}" type="datetimeFigureOut">
               <a:rPr lang="en-US" smtClean="0"/>
-              <a:t>7/20/18</a:t>
+              <a:t>7/19/19</a:t>
             </a:fld>
             <a:endParaRPr lang="en-US"/>
           </a:p>
@@ -3542,10 +3626,10 @@
       </p:grpSpPr>
       <p:pic>
         <p:nvPicPr>
-          <p:cNvPr id="4" name="Picture 3">
+          <p:cNvPr id="3" name="Picture 2" descr="A screenshot of a cell phone&#10;&#10;Description automatically generated">
             <a:extLst>
               <a:ext uri="{FF2B5EF4-FFF2-40B4-BE49-F238E27FC236}">
-                <a16:creationId xmlns:a16="http://schemas.microsoft.com/office/drawing/2014/main" id="{44EE59F8-CCE4-2445-A7DC-554623115B45}"/>
+                <a16:creationId xmlns:a16="http://schemas.microsoft.com/office/drawing/2014/main" id="{34C21825-D49A-A948-B963-9BACB9B8593C}"/>
               </a:ext>
             </a:extLst>
           </p:cNvPr>
@@ -3602,10 +3686,10 @@
       </p:grpSpPr>
       <p:pic>
         <p:nvPicPr>
-          <p:cNvPr id="6" name="Picture 5">
+          <p:cNvPr id="3" name="Picture 2">
             <a:extLst>
               <a:ext uri="{FF2B5EF4-FFF2-40B4-BE49-F238E27FC236}">
-                <a16:creationId xmlns:a16="http://schemas.microsoft.com/office/drawing/2014/main" id="{E6FD2E3B-1D9F-1F4C-83B7-9BD8C6E8B382}"/>
+                <a16:creationId xmlns:a16="http://schemas.microsoft.com/office/drawing/2014/main" id="{B5E7636B-FB41-AE45-B915-F2BAFA9BFED2}"/>
               </a:ext>
             </a:extLst>
           </p:cNvPr>

</xml_diff>

<commit_message>
Updated for THAT WI 2023
</commit_message>
<xml_diff>
--- a/Speaker Slides/SpeakerSlides.pptx
+++ b/Speaker Slides/SpeakerSlides.pptx
@@ -1,17 +1,18 @@
 
 <file path=ppt/presentation.xml><?xml version="1.0" encoding="utf-8"?>
-<p:presentation xmlns:a="http://schemas.openxmlformats.org/drawingml/2006/main" xmlns:r="http://schemas.openxmlformats.org/officeDocument/2006/relationships" xmlns:p="http://schemas.openxmlformats.org/presentationml/2006/main" xmlns:m="http://schemas.openxmlformats.org/officeDocument/2006/math" xmlns:a14="http://schemas.microsoft.com/office/drawing/2010/main">
+<p:presentation xmlns:a="http://schemas.openxmlformats.org/drawingml/2006/main" xmlns:r="http://schemas.openxmlformats.org/officeDocument/2006/relationships" xmlns:p="http://schemas.openxmlformats.org/presentationml/2006/main">
   <p:sldMasterIdLst>
-    <p:sldMasterId id="2147483648" r:id="rId5"/>
+    <p:sldMasterId id="2147483648" r:id="rId1"/>
   </p:sldMasterIdLst>
   <p:notesMasterIdLst>
     <p:notesMasterId r:id="rId7"/>
   </p:notesMasterIdLst>
   <p:sldIdLst>
-    <p:sldId id="256" r:id="rId8"/>
-    <p:sldId id="257" r:id="rId9"/>
-    <p:sldId id="258" r:id="rId10"/>
-    <p:sldId id="259" r:id="rId11"/>
+    <p:sldId id="256" r:id="rId2"/>
+    <p:sldId id="257" r:id="rId3"/>
+    <p:sldId id="258" r:id="rId4"/>
+    <p:sldId id="259" r:id="rId5"/>
+    <p:sldId id="260" r:id="rId6"/>
   </p:sldIdLst>
   <p:sldSz cx="24384000" cy="13716000"/>
   <p:notesSz cx="6858000" cy="9144000"/>
@@ -31,7 +32,7 @@
       <a:buFontTx/>
       <a:buNone/>
       <a:tabLst/>
-      <a:defRPr b="0" baseline="0" cap="none" i="0" spc="0" strike="noStrike" sz="1800" u="none" kumimoji="0" normalizeH="0">
+      <a:defRPr kumimoji="0" sz="1800" b="0" i="0" u="none" strike="noStrike" cap="none" spc="0" normalizeH="0" baseline="0">
         <a:ln>
           <a:noFill/>
         </a:ln>
@@ -57,7 +58,7 @@
       <a:buFontTx/>
       <a:buNone/>
       <a:tabLst/>
-      <a:defRPr b="0" baseline="0" cap="none" i="0" spc="0" strike="noStrike" sz="5000" u="none" kumimoji="0" normalizeH="0">
+      <a:defRPr kumimoji="0" sz="5000" b="0" i="0" u="none" strike="noStrike" cap="none" spc="0" normalizeH="0" baseline="0">
         <a:ln>
           <a:noFill/>
         </a:ln>
@@ -87,7 +88,7 @@
       <a:buFontTx/>
       <a:buNone/>
       <a:tabLst/>
-      <a:defRPr b="0" baseline="0" cap="none" i="0" spc="0" strike="noStrike" sz="5000" u="none" kumimoji="0" normalizeH="0">
+      <a:defRPr kumimoji="0" sz="5000" b="0" i="0" u="none" strike="noStrike" cap="none" spc="0" normalizeH="0" baseline="0">
         <a:ln>
           <a:noFill/>
         </a:ln>
@@ -117,7 +118,7 @@
       <a:buFontTx/>
       <a:buNone/>
       <a:tabLst/>
-      <a:defRPr b="0" baseline="0" cap="none" i="0" spc="0" strike="noStrike" sz="5000" u="none" kumimoji="0" normalizeH="0">
+      <a:defRPr kumimoji="0" sz="5000" b="0" i="0" u="none" strike="noStrike" cap="none" spc="0" normalizeH="0" baseline="0">
         <a:ln>
           <a:noFill/>
         </a:ln>
@@ -147,7 +148,7 @@
       <a:buFontTx/>
       <a:buNone/>
       <a:tabLst/>
-      <a:defRPr b="0" baseline="0" cap="none" i="0" spc="0" strike="noStrike" sz="5000" u="none" kumimoji="0" normalizeH="0">
+      <a:defRPr kumimoji="0" sz="5000" b="0" i="0" u="none" strike="noStrike" cap="none" spc="0" normalizeH="0" baseline="0">
         <a:ln>
           <a:noFill/>
         </a:ln>
@@ -177,7 +178,7 @@
       <a:buFontTx/>
       <a:buNone/>
       <a:tabLst/>
-      <a:defRPr b="0" baseline="0" cap="none" i="0" spc="0" strike="noStrike" sz="5000" u="none" kumimoji="0" normalizeH="0">
+      <a:defRPr kumimoji="0" sz="5000" b="0" i="0" u="none" strike="noStrike" cap="none" spc="0" normalizeH="0" baseline="0">
         <a:ln>
           <a:noFill/>
         </a:ln>
@@ -207,7 +208,7 @@
       <a:buFontTx/>
       <a:buNone/>
       <a:tabLst/>
-      <a:defRPr b="0" baseline="0" cap="none" i="0" spc="0" strike="noStrike" sz="5000" u="none" kumimoji="0" normalizeH="0">
+      <a:defRPr kumimoji="0" sz="5000" b="0" i="0" u="none" strike="noStrike" cap="none" spc="0" normalizeH="0" baseline="0">
         <a:ln>
           <a:noFill/>
         </a:ln>
@@ -237,7 +238,7 @@
       <a:buFontTx/>
       <a:buNone/>
       <a:tabLst/>
-      <a:defRPr b="0" baseline="0" cap="none" i="0" spc="0" strike="noStrike" sz="5000" u="none" kumimoji="0" normalizeH="0">
+      <a:defRPr kumimoji="0" sz="5000" b="0" i="0" u="none" strike="noStrike" cap="none" spc="0" normalizeH="0" baseline="0">
         <a:ln>
           <a:noFill/>
         </a:ln>
@@ -267,7 +268,7 @@
       <a:buFontTx/>
       <a:buNone/>
       <a:tabLst/>
-      <a:defRPr b="0" baseline="0" cap="none" i="0" spc="0" strike="noStrike" sz="5000" u="none" kumimoji="0" normalizeH="0">
+      <a:defRPr kumimoji="0" sz="5000" b="0" i="0" u="none" strike="noStrike" cap="none" spc="0" normalizeH="0" baseline="0">
         <a:ln>
           <a:noFill/>
         </a:ln>
@@ -297,7 +298,7 @@
       <a:buFontTx/>
       <a:buNone/>
       <a:tabLst/>
-      <a:defRPr b="0" baseline="0" cap="none" i="0" spc="0" strike="noStrike" sz="5000" u="none" kumimoji="0" normalizeH="0">
+      <a:defRPr kumimoji="0" sz="5000" b="0" i="0" u="none" strike="noStrike" cap="none" spc="0" normalizeH="0" baseline="0">
         <a:ln>
           <a:noFill/>
         </a:ln>
@@ -313,16 +314,22 @@
       </a:defRPr>
     </a:lvl9pPr>
   </p:defaultTextStyle>
+  <p:extLst>
+    <p:ext uri="{EFAFB233-063F-42B5-8137-9DF3F51BA10A}">
+      <p15:sldGuideLst xmlns:p15="http://schemas.microsoft.com/office/powerpoint/2012/main"/>
+    </p:ext>
+  </p:extLst>
 </p:presentation>
 </file>
 
-<file path=ppt/commentAuthors.xml><?xml version="1.0" encoding="utf-8"?>
-<p:cmAuthorLst xmlns:a="http://schemas.openxmlformats.org/drawingml/2006/main" xmlns:r="http://schemas.openxmlformats.org/officeDocument/2006/relationships" xmlns:p="http://schemas.openxmlformats.org/presentationml/2006/main" xmlns:m="http://schemas.openxmlformats.org/officeDocument/2006/math" xmlns:a14="http://schemas.microsoft.com/office/drawing/2010/main"/>
-</file>
-
 <file path=ppt/notesMasters/notesMaster1.xml><?xml version="1.0" encoding="utf-8"?>
-<p:notesMaster xmlns:a="http://schemas.openxmlformats.org/drawingml/2006/main" xmlns:r="http://schemas.openxmlformats.org/officeDocument/2006/relationships" xmlns:p="http://schemas.openxmlformats.org/presentationml/2006/main" xmlns:m="http://schemas.openxmlformats.org/officeDocument/2006/math" xmlns:a14="http://schemas.microsoft.com/office/drawing/2010/main">
+<p:notesMaster xmlns:a="http://schemas.openxmlformats.org/drawingml/2006/main" xmlns:r="http://schemas.openxmlformats.org/officeDocument/2006/relationships" xmlns:p="http://schemas.openxmlformats.org/presentationml/2006/main">
   <p:cSld>
+    <p:bg>
+      <p:bgRef idx="1001">
+        <a:schemeClr val="bg1"/>
+      </p:bgRef>
+    </p:bg>
     <p:spTree>
       <p:nvGrpSpPr>
         <p:cNvPr id="1" name=""/>
@@ -340,7 +347,9 @@
       <p:sp>
         <p:nvSpPr>
           <p:cNvPr id="116" name="Shape 116"/>
-          <p:cNvSpPr/>
+          <p:cNvSpPr>
+            <a:spLocks noGrp="1" noRot="1" noChangeAspect="1"/>
+          </p:cNvSpPr>
           <p:nvPr>
             <p:ph type="sldImg"/>
           </p:nvPr>
@@ -358,14 +367,16 @@
           <a:bodyPr/>
           <a:lstStyle/>
           <a:p>
-            <a:pPr/>
+            <a:endParaRPr/>
           </a:p>
         </p:txBody>
       </p:sp>
       <p:sp>
         <p:nvSpPr>
           <p:cNvPr id="117" name="Shape 117"/>
-          <p:cNvSpPr/>
+          <p:cNvSpPr>
+            <a:spLocks noGrp="1"/>
+          </p:cNvSpPr>
           <p:nvPr>
             <p:ph type="body" sz="quarter" idx="1"/>
           </p:nvPr>
@@ -383,7 +394,7 @@
           <a:bodyPr/>
           <a:lstStyle/>
           <a:p>
-            <a:pPr/>
+            <a:endParaRPr/>
           </a:p>
         </p:txBody>
       </p:sp>
@@ -495,7 +506,7 @@
 </file>
 
 <file path=ppt/slideLayouts/slideLayout1.xml><?xml version="1.0" encoding="utf-8"?>
-<p:sldLayout xmlns:a="http://schemas.openxmlformats.org/drawingml/2006/main" xmlns:r="http://schemas.openxmlformats.org/officeDocument/2006/relationships" xmlns:p="http://schemas.openxmlformats.org/presentationml/2006/main" xmlns:m="http://schemas.openxmlformats.org/officeDocument/2006/math" xmlns:a14="http://schemas.microsoft.com/office/drawing/2010/main" type="title" showMasterSp="1" showMasterPhAnim="1">
+<p:sldLayout xmlns:a="http://schemas.openxmlformats.org/drawingml/2006/main" xmlns:r="http://schemas.openxmlformats.org/officeDocument/2006/relationships" xmlns:p="http://schemas.openxmlformats.org/presentationml/2006/main" type="title">
   <p:cSld name="Title &amp; Subtitle">
     <p:spTree>
       <p:nvGrpSpPr>
@@ -514,7 +525,9 @@
       <p:sp>
         <p:nvSpPr>
           <p:cNvPr id="11" name="Title Text"/>
-          <p:cNvSpPr txBox="1"/>
+          <p:cNvSpPr txBox="1">
+            <a:spLocks noGrp="1"/>
+          </p:cNvSpPr>
           <p:nvPr>
             <p:ph type="title"/>
           </p:nvPr>
@@ -532,7 +545,6 @@
           <a:bodyPr anchor="b"/>
           <a:lstStyle/>
           <a:p>
-            <a:pPr/>
             <a:r>
               <a:t>Title Text</a:t>
             </a:r>
@@ -542,7 +554,9 @@
       <p:sp>
         <p:nvSpPr>
           <p:cNvPr id="12" name="Body Level One…"/>
-          <p:cNvSpPr txBox="1"/>
+          <p:cNvSpPr txBox="1">
+            <a:spLocks noGrp="1"/>
+          </p:cNvSpPr>
           <p:nvPr>
             <p:ph type="body" sz="quarter" idx="1"/>
           </p:nvPr>
@@ -601,7 +615,6 @@
             </a:lvl5pPr>
           </a:lstStyle>
           <a:p>
-            <a:pPr/>
             <a:r>
               <a:t>Body Level One</a:t>
             </a:r>
@@ -635,7 +648,9 @@
       <p:sp>
         <p:nvSpPr>
           <p:cNvPr id="13" name="Slide Number"/>
-          <p:cNvSpPr txBox="1"/>
+          <p:cNvSpPr txBox="1">
+            <a:spLocks noGrp="1"/>
+          </p:cNvSpPr>
           <p:nvPr>
             <p:ph type="sldNum" sz="quarter" idx="2"/>
           </p:nvPr>
@@ -649,8 +664,10 @@
           <a:bodyPr/>
           <a:lstStyle/>
           <a:p>
-            <a:pPr/>
-            <a:fld id="{86CB4B4D-7CA3-9044-876B-883B54F8677D}" type="slidenum"/>
+            <a:fld id="{86CB4B4D-7CA3-9044-876B-883B54F8677D}" type="slidenum">
+              <a:t>‹#›</a:t>
+            </a:fld>
+            <a:endParaRPr/>
           </a:p>
         </p:txBody>
       </p:sp>
@@ -659,12 +676,12 @@
   <p:clrMapOvr>
     <a:masterClrMapping/>
   </p:clrMapOvr>
-  <p:transition xmlns:p14="http://schemas.microsoft.com/office/powerpoint/2010/main" spd="med" advClick="1"/>
+  <p:transition spd="med"/>
 </p:sldLayout>
 </file>
 
 <file path=ppt/slideLayouts/slideLayout10.xml><?xml version="1.0" encoding="utf-8"?>
-<p:sldLayout xmlns:a="http://schemas.openxmlformats.org/drawingml/2006/main" xmlns:r="http://schemas.openxmlformats.org/officeDocument/2006/relationships" xmlns:p="http://schemas.openxmlformats.org/presentationml/2006/main" xmlns:m="http://schemas.openxmlformats.org/officeDocument/2006/math" xmlns:a14="http://schemas.microsoft.com/office/drawing/2010/main" type="tx" showMasterSp="1" showMasterPhAnim="1">
+<p:sldLayout xmlns:a="http://schemas.openxmlformats.org/drawingml/2006/main" xmlns:r="http://schemas.openxmlformats.org/officeDocument/2006/relationships" xmlns:p="http://schemas.openxmlformats.org/presentationml/2006/main" type="tx">
   <p:cSld name="Quote">
     <p:spTree>
       <p:nvGrpSpPr>
@@ -683,7 +700,9 @@
       <p:sp>
         <p:nvSpPr>
           <p:cNvPr id="93" name="–Johnny Appleseed"/>
-          <p:cNvSpPr/>
+          <p:cNvSpPr>
+            <a:spLocks noGrp="1"/>
+          </p:cNvSpPr>
           <p:nvPr>
             <p:ph type="body" sz="quarter" idx="21"/>
           </p:nvPr>
@@ -717,7 +736,6 @@
             </a:lvl1pPr>
           </a:lstStyle>
           <a:p>
-            <a:pPr/>
             <a:r>
               <a:t>–Johnny Appleseed</a:t>
             </a:r>
@@ -727,7 +745,9 @@
       <p:sp>
         <p:nvSpPr>
           <p:cNvPr id="94" name="“Type a quote here.”"/>
-          <p:cNvSpPr/>
+          <p:cNvSpPr>
+            <a:spLocks noGrp="1"/>
+          </p:cNvSpPr>
           <p:nvPr>
             <p:ph type="body" sz="quarter" idx="22"/>
           </p:nvPr>
@@ -756,7 +776,6 @@
             </a:lvl1pPr>
           </a:lstStyle>
           <a:p>
-            <a:pPr/>
             <a:r>
               <a:t>“Type a quote here.” </a:t>
             </a:r>
@@ -766,7 +785,9 @@
       <p:sp>
         <p:nvSpPr>
           <p:cNvPr id="95" name="Slide Number"/>
-          <p:cNvSpPr txBox="1"/>
+          <p:cNvSpPr txBox="1">
+            <a:spLocks noGrp="1"/>
+          </p:cNvSpPr>
           <p:nvPr>
             <p:ph type="sldNum" sz="quarter" idx="2"/>
           </p:nvPr>
@@ -780,8 +801,10 @@
           <a:bodyPr/>
           <a:lstStyle/>
           <a:p>
-            <a:pPr/>
-            <a:fld id="{86CB4B4D-7CA3-9044-876B-883B54F8677D}" type="slidenum"/>
+            <a:fld id="{86CB4B4D-7CA3-9044-876B-883B54F8677D}" type="slidenum">
+              <a:t>‹#›</a:t>
+            </a:fld>
+            <a:endParaRPr/>
           </a:p>
         </p:txBody>
       </p:sp>
@@ -790,12 +813,12 @@
   <p:clrMapOvr>
     <a:masterClrMapping/>
   </p:clrMapOvr>
-  <p:transition xmlns:p14="http://schemas.microsoft.com/office/powerpoint/2010/main" spd="med" advClick="1"/>
+  <p:transition spd="med"/>
 </p:sldLayout>
 </file>
 
 <file path=ppt/slideLayouts/slideLayout11.xml><?xml version="1.0" encoding="utf-8"?>
-<p:sldLayout xmlns:a="http://schemas.openxmlformats.org/drawingml/2006/main" xmlns:r="http://schemas.openxmlformats.org/officeDocument/2006/relationships" xmlns:p="http://schemas.openxmlformats.org/presentationml/2006/main" xmlns:m="http://schemas.openxmlformats.org/officeDocument/2006/math" xmlns:a14="http://schemas.microsoft.com/office/drawing/2010/main" type="tx" showMasterSp="1" showMasterPhAnim="1">
+<p:sldLayout xmlns:a="http://schemas.openxmlformats.org/drawingml/2006/main" xmlns:r="http://schemas.openxmlformats.org/officeDocument/2006/relationships" xmlns:p="http://schemas.openxmlformats.org/presentationml/2006/main" type="tx">
   <p:cSld name="Photo">
     <p:spTree>
       <p:nvGrpSpPr>
@@ -814,7 +837,9 @@
       <p:sp>
         <p:nvSpPr>
           <p:cNvPr id="102" name="Image"/>
-          <p:cNvSpPr/>
+          <p:cNvSpPr>
+            <a:spLocks noGrp="1"/>
+          </p:cNvSpPr>
           <p:nvPr>
             <p:ph type="pic" idx="21"/>
           </p:nvPr>
@@ -834,14 +859,16 @@
           </a:bodyPr>
           <a:lstStyle/>
           <a:p>
-            <a:pPr/>
+            <a:endParaRPr/>
           </a:p>
         </p:txBody>
       </p:sp>
       <p:sp>
         <p:nvSpPr>
           <p:cNvPr id="103" name="Slide Number"/>
-          <p:cNvSpPr txBox="1"/>
+          <p:cNvSpPr txBox="1">
+            <a:spLocks noGrp="1"/>
+          </p:cNvSpPr>
           <p:nvPr>
             <p:ph type="sldNum" sz="quarter" idx="2"/>
           </p:nvPr>
@@ -855,8 +882,10 @@
           <a:bodyPr/>
           <a:lstStyle/>
           <a:p>
-            <a:pPr/>
-            <a:fld id="{86CB4B4D-7CA3-9044-876B-883B54F8677D}" type="slidenum"/>
+            <a:fld id="{86CB4B4D-7CA3-9044-876B-883B54F8677D}" type="slidenum">
+              <a:t>‹#›</a:t>
+            </a:fld>
+            <a:endParaRPr/>
           </a:p>
         </p:txBody>
       </p:sp>
@@ -865,12 +894,12 @@
   <p:clrMapOvr>
     <a:masterClrMapping/>
   </p:clrMapOvr>
-  <p:transition xmlns:p14="http://schemas.microsoft.com/office/powerpoint/2010/main" spd="med" advClick="1"/>
+  <p:transition spd="med"/>
 </p:sldLayout>
 </file>
 
 <file path=ppt/slideLayouts/slideLayout12.xml><?xml version="1.0" encoding="utf-8"?>
-<p:sldLayout xmlns:a="http://schemas.openxmlformats.org/drawingml/2006/main" xmlns:r="http://schemas.openxmlformats.org/officeDocument/2006/relationships" xmlns:p="http://schemas.openxmlformats.org/presentationml/2006/main" xmlns:m="http://schemas.openxmlformats.org/officeDocument/2006/math" xmlns:a14="http://schemas.microsoft.com/office/drawing/2010/main" type="tx" showMasterSp="1" showMasterPhAnim="1">
+<p:sldLayout xmlns:a="http://schemas.openxmlformats.org/drawingml/2006/main" xmlns:r="http://schemas.openxmlformats.org/officeDocument/2006/relationships" xmlns:p="http://schemas.openxmlformats.org/presentationml/2006/main" type="tx">
   <p:cSld name="Blank">
     <p:spTree>
       <p:nvGrpSpPr>
@@ -889,7 +918,9 @@
       <p:sp>
         <p:nvSpPr>
           <p:cNvPr id="110" name="Slide Number"/>
-          <p:cNvSpPr txBox="1"/>
+          <p:cNvSpPr txBox="1">
+            <a:spLocks noGrp="1"/>
+          </p:cNvSpPr>
           <p:nvPr>
             <p:ph type="sldNum" sz="quarter" idx="2"/>
           </p:nvPr>
@@ -903,8 +934,10 @@
           <a:bodyPr/>
           <a:lstStyle/>
           <a:p>
-            <a:pPr/>
-            <a:fld id="{86CB4B4D-7CA3-9044-876B-883B54F8677D}" type="slidenum"/>
+            <a:fld id="{86CB4B4D-7CA3-9044-876B-883B54F8677D}" type="slidenum">
+              <a:t>‹#›</a:t>
+            </a:fld>
+            <a:endParaRPr/>
           </a:p>
         </p:txBody>
       </p:sp>
@@ -913,12 +946,12 @@
   <p:clrMapOvr>
     <a:masterClrMapping/>
   </p:clrMapOvr>
-  <p:transition xmlns:p14="http://schemas.microsoft.com/office/powerpoint/2010/main" spd="med" advClick="1"/>
+  <p:transition spd="med"/>
 </p:sldLayout>
 </file>
 
 <file path=ppt/slideLayouts/slideLayout2.xml><?xml version="1.0" encoding="utf-8"?>
-<p:sldLayout xmlns:a="http://schemas.openxmlformats.org/drawingml/2006/main" xmlns:r="http://schemas.openxmlformats.org/officeDocument/2006/relationships" xmlns:p="http://schemas.openxmlformats.org/presentationml/2006/main" xmlns:m="http://schemas.openxmlformats.org/officeDocument/2006/math" xmlns:a14="http://schemas.microsoft.com/office/drawing/2010/main" type="tx" showMasterSp="1" showMasterPhAnim="1">
+<p:sldLayout xmlns:a="http://schemas.openxmlformats.org/drawingml/2006/main" xmlns:r="http://schemas.openxmlformats.org/officeDocument/2006/relationships" xmlns:p="http://schemas.openxmlformats.org/presentationml/2006/main" type="tx">
   <p:cSld name="Photo - Horizontal">
     <p:spTree>
       <p:nvGrpSpPr>
@@ -937,7 +970,9 @@
       <p:sp>
         <p:nvSpPr>
           <p:cNvPr id="20" name="Image"/>
-          <p:cNvSpPr/>
+          <p:cNvSpPr>
+            <a:spLocks noGrp="1"/>
+          </p:cNvSpPr>
           <p:nvPr>
             <p:ph type="pic" sz="half" idx="21"/>
           </p:nvPr>
@@ -957,14 +992,16 @@
           </a:bodyPr>
           <a:lstStyle/>
           <a:p>
-            <a:pPr/>
+            <a:endParaRPr/>
           </a:p>
         </p:txBody>
       </p:sp>
       <p:sp>
         <p:nvSpPr>
           <p:cNvPr id="21" name="Title Text"/>
-          <p:cNvSpPr txBox="1"/>
+          <p:cNvSpPr txBox="1">
+            <a:spLocks noGrp="1"/>
+          </p:cNvSpPr>
           <p:nvPr>
             <p:ph type="title"/>
           </p:nvPr>
@@ -982,7 +1019,6 @@
           <a:bodyPr anchor="b"/>
           <a:lstStyle/>
           <a:p>
-            <a:pPr/>
             <a:r>
               <a:t>Title Text</a:t>
             </a:r>
@@ -992,7 +1028,9 @@
       <p:sp>
         <p:nvSpPr>
           <p:cNvPr id="22" name="Body Level One…"/>
-          <p:cNvSpPr txBox="1"/>
+          <p:cNvSpPr txBox="1">
+            <a:spLocks noGrp="1"/>
+          </p:cNvSpPr>
           <p:nvPr>
             <p:ph type="body" sz="quarter" idx="1"/>
           </p:nvPr>
@@ -1051,7 +1089,6 @@
             </a:lvl5pPr>
           </a:lstStyle>
           <a:p>
-            <a:pPr/>
             <a:r>
               <a:t>Body Level One</a:t>
             </a:r>
@@ -1085,7 +1122,9 @@
       <p:sp>
         <p:nvSpPr>
           <p:cNvPr id="23" name="Slide Number"/>
-          <p:cNvSpPr txBox="1"/>
+          <p:cNvSpPr txBox="1">
+            <a:spLocks noGrp="1"/>
+          </p:cNvSpPr>
           <p:nvPr>
             <p:ph type="sldNum" sz="quarter" idx="2"/>
           </p:nvPr>
@@ -1103,8 +1142,10 @@
           <a:bodyPr/>
           <a:lstStyle/>
           <a:p>
-            <a:pPr/>
-            <a:fld id="{86CB4B4D-7CA3-9044-876B-883B54F8677D}" type="slidenum"/>
+            <a:fld id="{86CB4B4D-7CA3-9044-876B-883B54F8677D}" type="slidenum">
+              <a:t>‹#›</a:t>
+            </a:fld>
+            <a:endParaRPr/>
           </a:p>
         </p:txBody>
       </p:sp>
@@ -1113,12 +1154,12 @@
   <p:clrMapOvr>
     <a:masterClrMapping/>
   </p:clrMapOvr>
-  <p:transition xmlns:p14="http://schemas.microsoft.com/office/powerpoint/2010/main" spd="med" advClick="1"/>
+  <p:transition spd="med"/>
 </p:sldLayout>
 </file>
 
 <file path=ppt/slideLayouts/slideLayout3.xml><?xml version="1.0" encoding="utf-8"?>
-<p:sldLayout xmlns:a="http://schemas.openxmlformats.org/drawingml/2006/main" xmlns:r="http://schemas.openxmlformats.org/officeDocument/2006/relationships" xmlns:p="http://schemas.openxmlformats.org/presentationml/2006/main" xmlns:m="http://schemas.openxmlformats.org/officeDocument/2006/math" xmlns:a14="http://schemas.microsoft.com/office/drawing/2010/main" type="tx" showMasterSp="1" showMasterPhAnim="1">
+<p:sldLayout xmlns:a="http://schemas.openxmlformats.org/drawingml/2006/main" xmlns:r="http://schemas.openxmlformats.org/officeDocument/2006/relationships" xmlns:p="http://schemas.openxmlformats.org/presentationml/2006/main" type="tx">
   <p:cSld name="Title - Center">
     <p:spTree>
       <p:nvGrpSpPr>
@@ -1137,7 +1178,9 @@
       <p:sp>
         <p:nvSpPr>
           <p:cNvPr id="30" name="Title Text"/>
-          <p:cNvSpPr txBox="1"/>
+          <p:cNvSpPr txBox="1">
+            <a:spLocks noGrp="1"/>
+          </p:cNvSpPr>
           <p:nvPr>
             <p:ph type="title"/>
           </p:nvPr>
@@ -1155,7 +1198,6 @@
           <a:bodyPr/>
           <a:lstStyle/>
           <a:p>
-            <a:pPr/>
             <a:r>
               <a:t>Title Text</a:t>
             </a:r>
@@ -1165,7 +1207,9 @@
       <p:sp>
         <p:nvSpPr>
           <p:cNvPr id="31" name="Slide Number"/>
-          <p:cNvSpPr txBox="1"/>
+          <p:cNvSpPr txBox="1">
+            <a:spLocks noGrp="1"/>
+          </p:cNvSpPr>
           <p:nvPr>
             <p:ph type="sldNum" sz="quarter" idx="2"/>
           </p:nvPr>
@@ -1179,8 +1223,10 @@
           <a:bodyPr/>
           <a:lstStyle/>
           <a:p>
-            <a:pPr/>
-            <a:fld id="{86CB4B4D-7CA3-9044-876B-883B54F8677D}" type="slidenum"/>
+            <a:fld id="{86CB4B4D-7CA3-9044-876B-883B54F8677D}" type="slidenum">
+              <a:t>‹#›</a:t>
+            </a:fld>
+            <a:endParaRPr/>
           </a:p>
         </p:txBody>
       </p:sp>
@@ -1189,12 +1235,12 @@
   <p:clrMapOvr>
     <a:masterClrMapping/>
   </p:clrMapOvr>
-  <p:transition xmlns:p14="http://schemas.microsoft.com/office/powerpoint/2010/main" spd="med" advClick="1"/>
+  <p:transition spd="med"/>
 </p:sldLayout>
 </file>
 
 <file path=ppt/slideLayouts/slideLayout4.xml><?xml version="1.0" encoding="utf-8"?>
-<p:sldLayout xmlns:a="http://schemas.openxmlformats.org/drawingml/2006/main" xmlns:r="http://schemas.openxmlformats.org/officeDocument/2006/relationships" xmlns:p="http://schemas.openxmlformats.org/presentationml/2006/main" xmlns:m="http://schemas.openxmlformats.org/officeDocument/2006/math" xmlns:a14="http://schemas.microsoft.com/office/drawing/2010/main" type="tx" showMasterSp="1" showMasterPhAnim="1">
+<p:sldLayout xmlns:a="http://schemas.openxmlformats.org/drawingml/2006/main" xmlns:r="http://schemas.openxmlformats.org/officeDocument/2006/relationships" xmlns:p="http://schemas.openxmlformats.org/presentationml/2006/main" type="tx">
   <p:cSld name="Photo - Vertical">
     <p:spTree>
       <p:nvGrpSpPr>
@@ -1213,7 +1259,9 @@
       <p:sp>
         <p:nvSpPr>
           <p:cNvPr id="38" name="Image"/>
-          <p:cNvSpPr/>
+          <p:cNvSpPr>
+            <a:spLocks noGrp="1"/>
+          </p:cNvSpPr>
           <p:nvPr>
             <p:ph type="pic" idx="21"/>
           </p:nvPr>
@@ -1233,14 +1281,16 @@
           </a:bodyPr>
           <a:lstStyle/>
           <a:p>
-            <a:pPr/>
+            <a:endParaRPr/>
           </a:p>
         </p:txBody>
       </p:sp>
       <p:sp>
         <p:nvSpPr>
           <p:cNvPr id="39" name="Title Text"/>
-          <p:cNvSpPr txBox="1"/>
+          <p:cNvSpPr txBox="1">
+            <a:spLocks noGrp="1"/>
+          </p:cNvSpPr>
           <p:nvPr>
             <p:ph type="title"/>
           </p:nvPr>
@@ -1262,7 +1312,6 @@
             </a:lvl1pPr>
           </a:lstStyle>
           <a:p>
-            <a:pPr/>
             <a:r>
               <a:t>Title Text</a:t>
             </a:r>
@@ -1272,7 +1321,9 @@
       <p:sp>
         <p:nvSpPr>
           <p:cNvPr id="40" name="Body Level One…"/>
-          <p:cNvSpPr txBox="1"/>
+          <p:cNvSpPr txBox="1">
+            <a:spLocks noGrp="1"/>
+          </p:cNvSpPr>
           <p:nvPr>
             <p:ph type="body" sz="quarter" idx="1"/>
           </p:nvPr>
@@ -1331,7 +1382,6 @@
             </a:lvl5pPr>
           </a:lstStyle>
           <a:p>
-            <a:pPr/>
             <a:r>
               <a:t>Body Level One</a:t>
             </a:r>
@@ -1365,7 +1415,9 @@
       <p:sp>
         <p:nvSpPr>
           <p:cNvPr id="41" name="Slide Number"/>
-          <p:cNvSpPr txBox="1"/>
+          <p:cNvSpPr txBox="1">
+            <a:spLocks noGrp="1"/>
+          </p:cNvSpPr>
           <p:nvPr>
             <p:ph type="sldNum" sz="quarter" idx="2"/>
           </p:nvPr>
@@ -1379,8 +1431,10 @@
           <a:bodyPr/>
           <a:lstStyle/>
           <a:p>
-            <a:pPr/>
-            <a:fld id="{86CB4B4D-7CA3-9044-876B-883B54F8677D}" type="slidenum"/>
+            <a:fld id="{86CB4B4D-7CA3-9044-876B-883B54F8677D}" type="slidenum">
+              <a:t>‹#›</a:t>
+            </a:fld>
+            <a:endParaRPr/>
           </a:p>
         </p:txBody>
       </p:sp>
@@ -1389,12 +1443,12 @@
   <p:clrMapOvr>
     <a:masterClrMapping/>
   </p:clrMapOvr>
-  <p:transition xmlns:p14="http://schemas.microsoft.com/office/powerpoint/2010/main" spd="med" advClick="1"/>
+  <p:transition spd="med"/>
 </p:sldLayout>
 </file>
 
 <file path=ppt/slideLayouts/slideLayout5.xml><?xml version="1.0" encoding="utf-8"?>
-<p:sldLayout xmlns:a="http://schemas.openxmlformats.org/drawingml/2006/main" xmlns:r="http://schemas.openxmlformats.org/officeDocument/2006/relationships" xmlns:p="http://schemas.openxmlformats.org/presentationml/2006/main" xmlns:m="http://schemas.openxmlformats.org/officeDocument/2006/math" xmlns:a14="http://schemas.microsoft.com/office/drawing/2010/main" type="tx" showMasterSp="1" showMasterPhAnim="1">
+<p:sldLayout xmlns:a="http://schemas.openxmlformats.org/drawingml/2006/main" xmlns:r="http://schemas.openxmlformats.org/officeDocument/2006/relationships" xmlns:p="http://schemas.openxmlformats.org/presentationml/2006/main" type="tx">
   <p:cSld name="Title - Top">
     <p:spTree>
       <p:nvGrpSpPr>
@@ -1413,7 +1467,9 @@
       <p:sp>
         <p:nvSpPr>
           <p:cNvPr id="48" name="Title Text"/>
-          <p:cNvSpPr txBox="1"/>
+          <p:cNvSpPr txBox="1">
+            <a:spLocks noGrp="1"/>
+          </p:cNvSpPr>
           <p:nvPr>
             <p:ph type="title"/>
           </p:nvPr>
@@ -1427,7 +1483,6 @@
           <a:bodyPr/>
           <a:lstStyle/>
           <a:p>
-            <a:pPr/>
             <a:r>
               <a:t>Title Text</a:t>
             </a:r>
@@ -1437,7 +1492,9 @@
       <p:sp>
         <p:nvSpPr>
           <p:cNvPr id="49" name="Slide Number"/>
-          <p:cNvSpPr txBox="1"/>
+          <p:cNvSpPr txBox="1">
+            <a:spLocks noGrp="1"/>
+          </p:cNvSpPr>
           <p:nvPr>
             <p:ph type="sldNum" sz="quarter" idx="2"/>
           </p:nvPr>
@@ -1451,8 +1508,10 @@
           <a:bodyPr/>
           <a:lstStyle/>
           <a:p>
-            <a:pPr/>
-            <a:fld id="{86CB4B4D-7CA3-9044-876B-883B54F8677D}" type="slidenum"/>
+            <a:fld id="{86CB4B4D-7CA3-9044-876B-883B54F8677D}" type="slidenum">
+              <a:t>‹#›</a:t>
+            </a:fld>
+            <a:endParaRPr/>
           </a:p>
         </p:txBody>
       </p:sp>
@@ -1461,12 +1520,12 @@
   <p:clrMapOvr>
     <a:masterClrMapping/>
   </p:clrMapOvr>
-  <p:transition xmlns:p14="http://schemas.microsoft.com/office/powerpoint/2010/main" spd="med" advClick="1"/>
+  <p:transition spd="med"/>
 </p:sldLayout>
 </file>
 
 <file path=ppt/slideLayouts/slideLayout6.xml><?xml version="1.0" encoding="utf-8"?>
-<p:sldLayout xmlns:a="http://schemas.openxmlformats.org/drawingml/2006/main" xmlns:r="http://schemas.openxmlformats.org/officeDocument/2006/relationships" xmlns:p="http://schemas.openxmlformats.org/presentationml/2006/main" xmlns:m="http://schemas.openxmlformats.org/officeDocument/2006/math" xmlns:a14="http://schemas.microsoft.com/office/drawing/2010/main" type="tx" showMasterSp="1" showMasterPhAnim="1">
+<p:sldLayout xmlns:a="http://schemas.openxmlformats.org/drawingml/2006/main" xmlns:r="http://schemas.openxmlformats.org/officeDocument/2006/relationships" xmlns:p="http://schemas.openxmlformats.org/presentationml/2006/main" type="tx">
   <p:cSld name="Title &amp; Bullets">
     <p:spTree>
       <p:nvGrpSpPr>
@@ -1485,7 +1544,9 @@
       <p:sp>
         <p:nvSpPr>
           <p:cNvPr id="56" name="Title Text"/>
-          <p:cNvSpPr txBox="1"/>
+          <p:cNvSpPr txBox="1">
+            <a:spLocks noGrp="1"/>
+          </p:cNvSpPr>
           <p:nvPr>
             <p:ph type="title"/>
           </p:nvPr>
@@ -1499,7 +1560,6 @@
           <a:bodyPr/>
           <a:lstStyle/>
           <a:p>
-            <a:pPr/>
             <a:r>
               <a:t>Title Text</a:t>
             </a:r>
@@ -1509,7 +1569,9 @@
       <p:sp>
         <p:nvSpPr>
           <p:cNvPr id="57" name="Body Level One…"/>
-          <p:cNvSpPr txBox="1"/>
+          <p:cNvSpPr txBox="1">
+            <a:spLocks noGrp="1"/>
+          </p:cNvSpPr>
           <p:nvPr>
             <p:ph type="body" idx="1"/>
           </p:nvPr>
@@ -1523,7 +1585,6 @@
           <a:bodyPr/>
           <a:lstStyle/>
           <a:p>
-            <a:pPr/>
             <a:r>
               <a:t>Body Level One</a:t>
             </a:r>
@@ -1557,7 +1618,9 @@
       <p:sp>
         <p:nvSpPr>
           <p:cNvPr id="58" name="Slide Number"/>
-          <p:cNvSpPr txBox="1"/>
+          <p:cNvSpPr txBox="1">
+            <a:spLocks noGrp="1"/>
+          </p:cNvSpPr>
           <p:nvPr>
             <p:ph type="sldNum" sz="quarter" idx="2"/>
           </p:nvPr>
@@ -1571,8 +1634,10 @@
           <a:bodyPr/>
           <a:lstStyle/>
           <a:p>
-            <a:pPr/>
-            <a:fld id="{86CB4B4D-7CA3-9044-876B-883B54F8677D}" type="slidenum"/>
+            <a:fld id="{86CB4B4D-7CA3-9044-876B-883B54F8677D}" type="slidenum">
+              <a:t>‹#›</a:t>
+            </a:fld>
+            <a:endParaRPr/>
           </a:p>
         </p:txBody>
       </p:sp>
@@ -1581,12 +1646,12 @@
   <p:clrMapOvr>
     <a:masterClrMapping/>
   </p:clrMapOvr>
-  <p:transition xmlns:p14="http://schemas.microsoft.com/office/powerpoint/2010/main" spd="med" advClick="1"/>
+  <p:transition spd="med"/>
 </p:sldLayout>
 </file>
 
 <file path=ppt/slideLayouts/slideLayout7.xml><?xml version="1.0" encoding="utf-8"?>
-<p:sldLayout xmlns:a="http://schemas.openxmlformats.org/drawingml/2006/main" xmlns:r="http://schemas.openxmlformats.org/officeDocument/2006/relationships" xmlns:p="http://schemas.openxmlformats.org/presentationml/2006/main" xmlns:m="http://schemas.openxmlformats.org/officeDocument/2006/math" xmlns:a14="http://schemas.microsoft.com/office/drawing/2010/main" type="tx" showMasterSp="1" showMasterPhAnim="1">
+<p:sldLayout xmlns:a="http://schemas.openxmlformats.org/drawingml/2006/main" xmlns:r="http://schemas.openxmlformats.org/officeDocument/2006/relationships" xmlns:p="http://schemas.openxmlformats.org/presentationml/2006/main" type="tx">
   <p:cSld name="Title, Bullets &amp; Photo">
     <p:spTree>
       <p:nvGrpSpPr>
@@ -1605,7 +1670,9 @@
       <p:sp>
         <p:nvSpPr>
           <p:cNvPr id="65" name="Image"/>
-          <p:cNvSpPr/>
+          <p:cNvSpPr>
+            <a:spLocks noGrp="1"/>
+          </p:cNvSpPr>
           <p:nvPr>
             <p:ph type="pic" sz="half" idx="21"/>
           </p:nvPr>
@@ -1625,14 +1692,16 @@
           </a:bodyPr>
           <a:lstStyle/>
           <a:p>
-            <a:pPr/>
+            <a:endParaRPr/>
           </a:p>
         </p:txBody>
       </p:sp>
       <p:sp>
         <p:nvSpPr>
           <p:cNvPr id="66" name="Title Text"/>
-          <p:cNvSpPr txBox="1"/>
+          <p:cNvSpPr txBox="1">
+            <a:spLocks noGrp="1"/>
+          </p:cNvSpPr>
           <p:nvPr>
             <p:ph type="title"/>
           </p:nvPr>
@@ -1646,7 +1715,6 @@
           <a:bodyPr/>
           <a:lstStyle/>
           <a:p>
-            <a:pPr/>
             <a:r>
               <a:t>Title Text</a:t>
             </a:r>
@@ -1656,7 +1724,9 @@
       <p:sp>
         <p:nvSpPr>
           <p:cNvPr id="67" name="Body Level One…"/>
-          <p:cNvSpPr txBox="1"/>
+          <p:cNvSpPr txBox="1">
+            <a:spLocks noGrp="1"/>
+          </p:cNvSpPr>
           <p:nvPr>
             <p:ph type="body" sz="quarter" idx="1"/>
           </p:nvPr>
@@ -1705,7 +1775,6 @@
             </a:lvl5pPr>
           </a:lstStyle>
           <a:p>
-            <a:pPr/>
             <a:r>
               <a:t>Body Level One</a:t>
             </a:r>
@@ -1739,7 +1808,9 @@
       <p:sp>
         <p:nvSpPr>
           <p:cNvPr id="68" name="Slide Number"/>
-          <p:cNvSpPr txBox="1"/>
+          <p:cNvSpPr txBox="1">
+            <a:spLocks noGrp="1"/>
+          </p:cNvSpPr>
           <p:nvPr>
             <p:ph type="sldNum" sz="quarter" idx="2"/>
           </p:nvPr>
@@ -1753,8 +1824,10 @@
           <a:bodyPr/>
           <a:lstStyle/>
           <a:p>
-            <a:pPr/>
-            <a:fld id="{86CB4B4D-7CA3-9044-876B-883B54F8677D}" type="slidenum"/>
+            <a:fld id="{86CB4B4D-7CA3-9044-876B-883B54F8677D}" type="slidenum">
+              <a:t>‹#›</a:t>
+            </a:fld>
+            <a:endParaRPr/>
           </a:p>
         </p:txBody>
       </p:sp>
@@ -1763,12 +1836,12 @@
   <p:clrMapOvr>
     <a:masterClrMapping/>
   </p:clrMapOvr>
-  <p:transition xmlns:p14="http://schemas.microsoft.com/office/powerpoint/2010/main" spd="med" advClick="1"/>
+  <p:transition spd="med"/>
 </p:sldLayout>
 </file>
 
 <file path=ppt/slideLayouts/slideLayout8.xml><?xml version="1.0" encoding="utf-8"?>
-<p:sldLayout xmlns:a="http://schemas.openxmlformats.org/drawingml/2006/main" xmlns:r="http://schemas.openxmlformats.org/officeDocument/2006/relationships" xmlns:p="http://schemas.openxmlformats.org/presentationml/2006/main" xmlns:m="http://schemas.openxmlformats.org/officeDocument/2006/math" xmlns:a14="http://schemas.microsoft.com/office/drawing/2010/main" type="tx" showMasterSp="1" showMasterPhAnim="1">
+<p:sldLayout xmlns:a="http://schemas.openxmlformats.org/drawingml/2006/main" xmlns:r="http://schemas.openxmlformats.org/officeDocument/2006/relationships" xmlns:p="http://schemas.openxmlformats.org/presentationml/2006/main" type="tx">
   <p:cSld name="Bullets">
     <p:spTree>
       <p:nvGrpSpPr>
@@ -1787,7 +1860,9 @@
       <p:sp>
         <p:nvSpPr>
           <p:cNvPr id="75" name="Body Level One…"/>
-          <p:cNvSpPr txBox="1"/>
+          <p:cNvSpPr txBox="1">
+            <a:spLocks noGrp="1"/>
+          </p:cNvSpPr>
           <p:nvPr>
             <p:ph type="body" idx="1"/>
           </p:nvPr>
@@ -1805,7 +1880,6 @@
           <a:bodyPr/>
           <a:lstStyle/>
           <a:p>
-            <a:pPr/>
             <a:r>
               <a:t>Body Level One</a:t>
             </a:r>
@@ -1839,7 +1913,9 @@
       <p:sp>
         <p:nvSpPr>
           <p:cNvPr id="76" name="Slide Number"/>
-          <p:cNvSpPr txBox="1"/>
+          <p:cNvSpPr txBox="1">
+            <a:spLocks noGrp="1"/>
+          </p:cNvSpPr>
           <p:nvPr>
             <p:ph type="sldNum" sz="quarter" idx="2"/>
           </p:nvPr>
@@ -1853,8 +1929,10 @@
           <a:bodyPr/>
           <a:lstStyle/>
           <a:p>
-            <a:pPr/>
-            <a:fld id="{86CB4B4D-7CA3-9044-876B-883B54F8677D}" type="slidenum"/>
+            <a:fld id="{86CB4B4D-7CA3-9044-876B-883B54F8677D}" type="slidenum">
+              <a:t>‹#›</a:t>
+            </a:fld>
+            <a:endParaRPr/>
           </a:p>
         </p:txBody>
       </p:sp>
@@ -1863,12 +1941,12 @@
   <p:clrMapOvr>
     <a:masterClrMapping/>
   </p:clrMapOvr>
-  <p:transition xmlns:p14="http://schemas.microsoft.com/office/powerpoint/2010/main" spd="med" advClick="1"/>
+  <p:transition spd="med"/>
 </p:sldLayout>
 </file>
 
 <file path=ppt/slideLayouts/slideLayout9.xml><?xml version="1.0" encoding="utf-8"?>
-<p:sldLayout xmlns:a="http://schemas.openxmlformats.org/drawingml/2006/main" xmlns:r="http://schemas.openxmlformats.org/officeDocument/2006/relationships" xmlns:p="http://schemas.openxmlformats.org/presentationml/2006/main" xmlns:m="http://schemas.openxmlformats.org/officeDocument/2006/math" xmlns:a14="http://schemas.microsoft.com/office/drawing/2010/main" type="tx" showMasterSp="1" showMasterPhAnim="1">
+<p:sldLayout xmlns:a="http://schemas.openxmlformats.org/drawingml/2006/main" xmlns:r="http://schemas.openxmlformats.org/officeDocument/2006/relationships" xmlns:p="http://schemas.openxmlformats.org/presentationml/2006/main" type="tx">
   <p:cSld name="Photo - 3 Up">
     <p:spTree>
       <p:nvGrpSpPr>
@@ -1887,7 +1965,9 @@
       <p:sp>
         <p:nvSpPr>
           <p:cNvPr id="83" name="Image"/>
-          <p:cNvSpPr/>
+          <p:cNvSpPr>
+            <a:spLocks noGrp="1"/>
+          </p:cNvSpPr>
           <p:nvPr>
             <p:ph type="pic" sz="quarter" idx="21"/>
           </p:nvPr>
@@ -1907,14 +1987,16 @@
           </a:bodyPr>
           <a:lstStyle/>
           <a:p>
-            <a:pPr/>
+            <a:endParaRPr/>
           </a:p>
         </p:txBody>
       </p:sp>
       <p:sp>
         <p:nvSpPr>
           <p:cNvPr id="84" name="Image"/>
-          <p:cNvSpPr/>
+          <p:cNvSpPr>
+            <a:spLocks noGrp="1"/>
+          </p:cNvSpPr>
           <p:nvPr>
             <p:ph type="pic" sz="quarter" idx="22"/>
           </p:nvPr>
@@ -1934,14 +2016,16 @@
           </a:bodyPr>
           <a:lstStyle/>
           <a:p>
-            <a:pPr/>
+            <a:endParaRPr/>
           </a:p>
         </p:txBody>
       </p:sp>
       <p:sp>
         <p:nvSpPr>
           <p:cNvPr id="85" name="Image"/>
-          <p:cNvSpPr/>
+          <p:cNvSpPr>
+            <a:spLocks noGrp="1"/>
+          </p:cNvSpPr>
           <p:nvPr>
             <p:ph type="pic" idx="23"/>
           </p:nvPr>
@@ -1961,14 +2045,16 @@
           </a:bodyPr>
           <a:lstStyle/>
           <a:p>
-            <a:pPr/>
+            <a:endParaRPr/>
           </a:p>
         </p:txBody>
       </p:sp>
       <p:sp>
         <p:nvSpPr>
           <p:cNvPr id="86" name="Slide Number"/>
-          <p:cNvSpPr txBox="1"/>
+          <p:cNvSpPr txBox="1">
+            <a:spLocks noGrp="1"/>
+          </p:cNvSpPr>
           <p:nvPr>
             <p:ph type="sldNum" sz="quarter" idx="2"/>
           </p:nvPr>
@@ -1982,8 +2068,10 @@
           <a:bodyPr/>
           <a:lstStyle/>
           <a:p>
-            <a:pPr/>
-            <a:fld id="{86CB4B4D-7CA3-9044-876B-883B54F8677D}" type="slidenum"/>
+            <a:fld id="{86CB4B4D-7CA3-9044-876B-883B54F8677D}" type="slidenum">
+              <a:t>‹#›</a:t>
+            </a:fld>
+            <a:endParaRPr/>
           </a:p>
         </p:txBody>
       </p:sp>
@@ -1992,18 +2080,19 @@
   <p:clrMapOvr>
     <a:masterClrMapping/>
   </p:clrMapOvr>
-  <p:transition xmlns:p14="http://schemas.microsoft.com/office/powerpoint/2010/main" spd="med" advClick="1"/>
+  <p:transition spd="med"/>
 </p:sldLayout>
 </file>
 
 <file path=ppt/slideMasters/slideMaster1.xml><?xml version="1.0" encoding="utf-8"?>
-<p:sldMaster xmlns:a="http://schemas.openxmlformats.org/drawingml/2006/main" xmlns:r="http://schemas.openxmlformats.org/officeDocument/2006/relationships" xmlns:p="http://schemas.openxmlformats.org/presentationml/2006/main" xmlns:m="http://schemas.openxmlformats.org/officeDocument/2006/math" xmlns:a14="http://schemas.microsoft.com/office/drawing/2010/main">
+<p:sldMaster xmlns:a="http://schemas.openxmlformats.org/drawingml/2006/main" xmlns:r="http://schemas.openxmlformats.org/officeDocument/2006/relationships" xmlns:p="http://schemas.openxmlformats.org/presentationml/2006/main">
   <p:cSld>
     <p:bg>
       <p:bgPr>
         <a:solidFill>
           <a:srgbClr val="FFFFFF"/>
         </a:solidFill>
+        <a:effectLst/>
       </p:bgPr>
     </p:bg>
     <p:spTree>
@@ -2023,7 +2112,9 @@
       <p:sp>
         <p:nvSpPr>
           <p:cNvPr id="2" name="Title Text"/>
-          <p:cNvSpPr txBox="1"/>
+          <p:cNvSpPr txBox="1">
+            <a:spLocks noGrp="1"/>
+          </p:cNvSpPr>
           <p:nvPr>
             <p:ph type="title"/>
           </p:nvPr>
@@ -2041,17 +2132,16 @@
           </a:ln>
           <a:extLst>
             <a:ext uri="{C572A759-6A51-4108-AA02-DFA0A04FC94B}">
-              <ma14:wrappingTextBoxFlag xmlns:ma14="http://schemas.microsoft.com/office/mac/drawingml/2011/main" val="1"/>
+              <ma14:wrappingTextBoxFlag xmlns="" xmlns:m="http://schemas.openxmlformats.org/officeDocument/2006/math" xmlns:a14="http://schemas.microsoft.com/office/drawing/2010/main" xmlns:ma14="http://schemas.microsoft.com/office/mac/drawingml/2011/main" val="1"/>
             </a:ext>
           </a:extLst>
         </p:spPr>
         <p:txBody>
           <a:bodyPr lIns="71437" tIns="71437" rIns="71437" bIns="71437" anchor="ctr">
-            <a:normAutofit fontScale="100000" lnSpcReduction="0"/>
+            <a:normAutofit/>
           </a:bodyPr>
           <a:lstStyle/>
           <a:p>
-            <a:pPr/>
             <a:r>
               <a:t>Title Text</a:t>
             </a:r>
@@ -2061,7 +2151,9 @@
       <p:sp>
         <p:nvSpPr>
           <p:cNvPr id="3" name="Body Level One…"/>
-          <p:cNvSpPr txBox="1"/>
+          <p:cNvSpPr txBox="1">
+            <a:spLocks noGrp="1"/>
+          </p:cNvSpPr>
           <p:nvPr>
             <p:ph type="body" idx="1"/>
           </p:nvPr>
@@ -2079,17 +2171,16 @@
           </a:ln>
           <a:extLst>
             <a:ext uri="{C572A759-6A51-4108-AA02-DFA0A04FC94B}">
-              <ma14:wrappingTextBoxFlag xmlns:ma14="http://schemas.microsoft.com/office/mac/drawingml/2011/main" val="1"/>
+              <ma14:wrappingTextBoxFlag xmlns="" xmlns:m="http://schemas.openxmlformats.org/officeDocument/2006/math" xmlns:a14="http://schemas.microsoft.com/office/drawing/2010/main" xmlns:ma14="http://schemas.microsoft.com/office/mac/drawingml/2011/main" val="1"/>
             </a:ext>
           </a:extLst>
         </p:spPr>
         <p:txBody>
           <a:bodyPr lIns="71437" tIns="71437" rIns="71437" bIns="71437" anchor="ctr">
-            <a:normAutofit fontScale="100000" lnSpcReduction="0"/>
+            <a:normAutofit/>
           </a:bodyPr>
           <a:lstStyle/>
           <a:p>
-            <a:pPr/>
             <a:r>
               <a:t>Body Level One</a:t>
             </a:r>
@@ -2123,7 +2214,9 @@
       <p:sp>
         <p:nvSpPr>
           <p:cNvPr id="4" name="Slide Number"/>
-          <p:cNvSpPr txBox="1"/>
+          <p:cNvSpPr txBox="1">
+            <a:spLocks noGrp="1"/>
+          </p:cNvSpPr>
           <p:nvPr>
             <p:ph type="sldNum" sz="quarter" idx="2"/>
           </p:nvPr>
@@ -2150,8 +2243,10 @@
             </a:lvl1pPr>
           </a:lstStyle>
           <a:p>
-            <a:pPr/>
-            <a:fld id="{86CB4B4D-7CA3-9044-876B-883B54F8677D}" type="slidenum"/>
+            <a:fld id="{86CB4B4D-7CA3-9044-876B-883B54F8677D}" type="slidenum">
+              <a:t>‹#›</a:t>
+            </a:fld>
+            <a:endParaRPr/>
           </a:p>
         </p:txBody>
       </p:sp>
@@ -2159,20 +2254,20 @@
   </p:cSld>
   <p:clrMap bg1="lt1" tx1="dk1" bg2="lt2" tx2="dk2" accent1="accent1" accent2="accent2" accent3="accent3" accent4="accent4" accent5="accent5" accent6="accent6" hlink="hlink" folHlink="folHlink"/>
   <p:sldLayoutIdLst>
-    <p:sldLayoutId id="2147483649" r:id="rId2"/>
-    <p:sldLayoutId id="2147483650" r:id="rId3"/>
-    <p:sldLayoutId id="2147483651" r:id="rId4"/>
-    <p:sldLayoutId id="2147483652" r:id="rId5"/>
-    <p:sldLayoutId id="2147483653" r:id="rId6"/>
-    <p:sldLayoutId id="2147483654" r:id="rId7"/>
-    <p:sldLayoutId id="2147483655" r:id="rId8"/>
-    <p:sldLayoutId id="2147483656" r:id="rId9"/>
-    <p:sldLayoutId id="2147483657" r:id="rId10"/>
-    <p:sldLayoutId id="2147483658" r:id="rId11"/>
-    <p:sldLayoutId id="2147483659" r:id="rId12"/>
-    <p:sldLayoutId id="2147483660" r:id="rId13"/>
+    <p:sldLayoutId id="2147483649" r:id="rId1"/>
+    <p:sldLayoutId id="2147483650" r:id="rId2"/>
+    <p:sldLayoutId id="2147483651" r:id="rId3"/>
+    <p:sldLayoutId id="2147483652" r:id="rId4"/>
+    <p:sldLayoutId id="2147483653" r:id="rId5"/>
+    <p:sldLayoutId id="2147483654" r:id="rId6"/>
+    <p:sldLayoutId id="2147483655" r:id="rId7"/>
+    <p:sldLayoutId id="2147483656" r:id="rId8"/>
+    <p:sldLayoutId id="2147483657" r:id="rId9"/>
+    <p:sldLayoutId id="2147483658" r:id="rId10"/>
+    <p:sldLayoutId id="2147483659" r:id="rId11"/>
+    <p:sldLayoutId id="2147483660" r:id="rId12"/>
   </p:sldLayoutIdLst>
-  <p:transition xmlns:p14="http://schemas.microsoft.com/office/powerpoint/2010/main" spd="med" advClick="1"/>
+  <p:transition spd="med"/>
   <p:txStyles>
     <p:titleStyle>
       <a:lvl1pPr marL="0" marR="0" indent="0" algn="ctr" defTabSz="584200" rtl="0" latinLnBrk="0">
@@ -2190,7 +2285,7 @@
         <a:buFontTx/>
         <a:buNone/>
         <a:tabLst/>
-        <a:defRPr b="0" baseline="0" cap="none" i="0" spc="0" strike="noStrike" sz="11200" u="none">
+        <a:defRPr sz="11200" b="0" i="0" u="none" strike="noStrike" cap="none" spc="0" baseline="0">
           <a:solidFill>
             <a:srgbClr val="000000"/>
           </a:solidFill>
@@ -2216,7 +2311,7 @@
         <a:buFontTx/>
         <a:buNone/>
         <a:tabLst/>
-        <a:defRPr b="0" baseline="0" cap="none" i="0" spc="0" strike="noStrike" sz="11200" u="none">
+        <a:defRPr sz="11200" b="0" i="0" u="none" strike="noStrike" cap="none" spc="0" baseline="0">
           <a:solidFill>
             <a:srgbClr val="000000"/>
           </a:solidFill>
@@ -2242,7 +2337,7 @@
         <a:buFontTx/>
         <a:buNone/>
         <a:tabLst/>
-        <a:defRPr b="0" baseline="0" cap="none" i="0" spc="0" strike="noStrike" sz="11200" u="none">
+        <a:defRPr sz="11200" b="0" i="0" u="none" strike="noStrike" cap="none" spc="0" baseline="0">
           <a:solidFill>
             <a:srgbClr val="000000"/>
           </a:solidFill>
@@ -2268,7 +2363,7 @@
         <a:buFontTx/>
         <a:buNone/>
         <a:tabLst/>
-        <a:defRPr b="0" baseline="0" cap="none" i="0" spc="0" strike="noStrike" sz="11200" u="none">
+        <a:defRPr sz="11200" b="0" i="0" u="none" strike="noStrike" cap="none" spc="0" baseline="0">
           <a:solidFill>
             <a:srgbClr val="000000"/>
           </a:solidFill>
@@ -2294,7 +2389,7 @@
         <a:buFontTx/>
         <a:buNone/>
         <a:tabLst/>
-        <a:defRPr b="0" baseline="0" cap="none" i="0" spc="0" strike="noStrike" sz="11200" u="none">
+        <a:defRPr sz="11200" b="0" i="0" u="none" strike="noStrike" cap="none" spc="0" baseline="0">
           <a:solidFill>
             <a:srgbClr val="000000"/>
           </a:solidFill>
@@ -2320,7 +2415,7 @@
         <a:buFontTx/>
         <a:buNone/>
         <a:tabLst/>
-        <a:defRPr b="0" baseline="0" cap="none" i="0" spc="0" strike="noStrike" sz="11200" u="none">
+        <a:defRPr sz="11200" b="0" i="0" u="none" strike="noStrike" cap="none" spc="0" baseline="0">
           <a:solidFill>
             <a:srgbClr val="000000"/>
           </a:solidFill>
@@ -2346,7 +2441,7 @@
         <a:buFontTx/>
         <a:buNone/>
         <a:tabLst/>
-        <a:defRPr b="0" baseline="0" cap="none" i="0" spc="0" strike="noStrike" sz="11200" u="none">
+        <a:defRPr sz="11200" b="0" i="0" u="none" strike="noStrike" cap="none" spc="0" baseline="0">
           <a:solidFill>
             <a:srgbClr val="000000"/>
           </a:solidFill>
@@ -2372,7 +2467,7 @@
         <a:buFontTx/>
         <a:buNone/>
         <a:tabLst/>
-        <a:defRPr b="0" baseline="0" cap="none" i="0" spc="0" strike="noStrike" sz="11200" u="none">
+        <a:defRPr sz="11200" b="0" i="0" u="none" strike="noStrike" cap="none" spc="0" baseline="0">
           <a:solidFill>
             <a:srgbClr val="000000"/>
           </a:solidFill>
@@ -2398,7 +2493,7 @@
         <a:buFontTx/>
         <a:buNone/>
         <a:tabLst/>
-        <a:defRPr b="0" baseline="0" cap="none" i="0" spc="0" strike="noStrike" sz="11200" u="none">
+        <a:defRPr sz="11200" b="0" i="0" u="none" strike="noStrike" cap="none" spc="0" baseline="0">
           <a:solidFill>
             <a:srgbClr val="000000"/>
           </a:solidFill>
@@ -2426,7 +2521,7 @@
         <a:buFontTx/>
         <a:buChar char="•"/>
         <a:tabLst/>
-        <a:defRPr b="0" baseline="0" cap="none" i="0" spc="0" strike="noStrike" sz="5000" u="none">
+        <a:defRPr sz="5000" b="0" i="0" u="none" strike="noStrike" cap="none" spc="0" baseline="0">
           <a:solidFill>
             <a:srgbClr val="000000"/>
           </a:solidFill>
@@ -2452,7 +2547,7 @@
         <a:buFontTx/>
         <a:buChar char="•"/>
         <a:tabLst/>
-        <a:defRPr b="0" baseline="0" cap="none" i="0" spc="0" strike="noStrike" sz="5000" u="none">
+        <a:defRPr sz="5000" b="0" i="0" u="none" strike="noStrike" cap="none" spc="0" baseline="0">
           <a:solidFill>
             <a:srgbClr val="000000"/>
           </a:solidFill>
@@ -2478,7 +2573,7 @@
         <a:buFontTx/>
         <a:buChar char="•"/>
         <a:tabLst/>
-        <a:defRPr b="0" baseline="0" cap="none" i="0" spc="0" strike="noStrike" sz="5000" u="none">
+        <a:defRPr sz="5000" b="0" i="0" u="none" strike="noStrike" cap="none" spc="0" baseline="0">
           <a:solidFill>
             <a:srgbClr val="000000"/>
           </a:solidFill>
@@ -2504,7 +2599,7 @@
         <a:buFontTx/>
         <a:buChar char="•"/>
         <a:tabLst/>
-        <a:defRPr b="0" baseline="0" cap="none" i="0" spc="0" strike="noStrike" sz="5000" u="none">
+        <a:defRPr sz="5000" b="0" i="0" u="none" strike="noStrike" cap="none" spc="0" baseline="0">
           <a:solidFill>
             <a:srgbClr val="000000"/>
           </a:solidFill>
@@ -2530,7 +2625,7 @@
         <a:buFontTx/>
         <a:buChar char="•"/>
         <a:tabLst/>
-        <a:defRPr b="0" baseline="0" cap="none" i="0" spc="0" strike="noStrike" sz="5000" u="none">
+        <a:defRPr sz="5000" b="0" i="0" u="none" strike="noStrike" cap="none" spc="0" baseline="0">
           <a:solidFill>
             <a:srgbClr val="000000"/>
           </a:solidFill>
@@ -2556,7 +2651,7 @@
         <a:buFontTx/>
         <a:buChar char="•"/>
         <a:tabLst/>
-        <a:defRPr b="0" baseline="0" cap="none" i="0" spc="0" strike="noStrike" sz="5000" u="none">
+        <a:defRPr sz="5000" b="0" i="0" u="none" strike="noStrike" cap="none" spc="0" baseline="0">
           <a:solidFill>
             <a:srgbClr val="000000"/>
           </a:solidFill>
@@ -2582,7 +2677,7 @@
         <a:buFontTx/>
         <a:buChar char="•"/>
         <a:tabLst/>
-        <a:defRPr b="0" baseline="0" cap="none" i="0" spc="0" strike="noStrike" sz="5000" u="none">
+        <a:defRPr sz="5000" b="0" i="0" u="none" strike="noStrike" cap="none" spc="0" baseline="0">
           <a:solidFill>
             <a:srgbClr val="000000"/>
           </a:solidFill>
@@ -2608,7 +2703,7 @@
         <a:buFontTx/>
         <a:buChar char="•"/>
         <a:tabLst/>
-        <a:defRPr b="0" baseline="0" cap="none" i="0" spc="0" strike="noStrike" sz="5000" u="none">
+        <a:defRPr sz="5000" b="0" i="0" u="none" strike="noStrike" cap="none" spc="0" baseline="0">
           <a:solidFill>
             <a:srgbClr val="000000"/>
           </a:solidFill>
@@ -2634,7 +2729,7 @@
         <a:buFontTx/>
         <a:buChar char="•"/>
         <a:tabLst/>
-        <a:defRPr b="0" baseline="0" cap="none" i="0" spc="0" strike="noStrike" sz="5000" u="none">
+        <a:defRPr sz="5000" b="0" i="0" u="none" strike="noStrike" cap="none" spc="0" baseline="0">
           <a:solidFill>
             <a:srgbClr val="000000"/>
           </a:solidFill>
@@ -2662,7 +2757,7 @@
         <a:buFontTx/>
         <a:buNone/>
         <a:tabLst/>
-        <a:defRPr b="0" baseline="0" cap="none" i="0" spc="0" strike="noStrike" sz="2400" u="none">
+        <a:defRPr sz="2400" b="0" i="0" u="none" strike="noStrike" cap="none" spc="0" baseline="0">
           <a:solidFill>
             <a:schemeClr val="tx1"/>
           </a:solidFill>
@@ -2688,7 +2783,7 @@
         <a:buFontTx/>
         <a:buNone/>
         <a:tabLst/>
-        <a:defRPr b="0" baseline="0" cap="none" i="0" spc="0" strike="noStrike" sz="2400" u="none">
+        <a:defRPr sz="2400" b="0" i="0" u="none" strike="noStrike" cap="none" spc="0" baseline="0">
           <a:solidFill>
             <a:schemeClr val="tx1"/>
           </a:solidFill>
@@ -2714,7 +2809,7 @@
         <a:buFontTx/>
         <a:buNone/>
         <a:tabLst/>
-        <a:defRPr b="0" baseline="0" cap="none" i="0" spc="0" strike="noStrike" sz="2400" u="none">
+        <a:defRPr sz="2400" b="0" i="0" u="none" strike="noStrike" cap="none" spc="0" baseline="0">
           <a:solidFill>
             <a:schemeClr val="tx1"/>
           </a:solidFill>
@@ -2740,7 +2835,7 @@
         <a:buFontTx/>
         <a:buNone/>
         <a:tabLst/>
-        <a:defRPr b="0" baseline="0" cap="none" i="0" spc="0" strike="noStrike" sz="2400" u="none">
+        <a:defRPr sz="2400" b="0" i="0" u="none" strike="noStrike" cap="none" spc="0" baseline="0">
           <a:solidFill>
             <a:schemeClr val="tx1"/>
           </a:solidFill>
@@ -2766,7 +2861,7 @@
         <a:buFontTx/>
         <a:buNone/>
         <a:tabLst/>
-        <a:defRPr b="0" baseline="0" cap="none" i="0" spc="0" strike="noStrike" sz="2400" u="none">
+        <a:defRPr sz="2400" b="0" i="0" u="none" strike="noStrike" cap="none" spc="0" baseline="0">
           <a:solidFill>
             <a:schemeClr val="tx1"/>
           </a:solidFill>
@@ -2792,7 +2887,7 @@
         <a:buFontTx/>
         <a:buNone/>
         <a:tabLst/>
-        <a:defRPr b="0" baseline="0" cap="none" i="0" spc="0" strike="noStrike" sz="2400" u="none">
+        <a:defRPr sz="2400" b="0" i="0" u="none" strike="noStrike" cap="none" spc="0" baseline="0">
           <a:solidFill>
             <a:schemeClr val="tx1"/>
           </a:solidFill>
@@ -2818,7 +2913,7 @@
         <a:buFontTx/>
         <a:buNone/>
         <a:tabLst/>
-        <a:defRPr b="0" baseline="0" cap="none" i="0" spc="0" strike="noStrike" sz="2400" u="none">
+        <a:defRPr sz="2400" b="0" i="0" u="none" strike="noStrike" cap="none" spc="0" baseline="0">
           <a:solidFill>
             <a:schemeClr val="tx1"/>
           </a:solidFill>
@@ -2844,7 +2939,7 @@
         <a:buFontTx/>
         <a:buNone/>
         <a:tabLst/>
-        <a:defRPr b="0" baseline="0" cap="none" i="0" spc="0" strike="noStrike" sz="2400" u="none">
+        <a:defRPr sz="2400" b="0" i="0" u="none" strike="noStrike" cap="none" spc="0" baseline="0">
           <a:solidFill>
             <a:schemeClr val="tx1"/>
           </a:solidFill>
@@ -2870,7 +2965,7 @@
         <a:buFontTx/>
         <a:buNone/>
         <a:tabLst/>
-        <a:defRPr b="0" baseline="0" cap="none" i="0" spc="0" strike="noStrike" sz="2400" u="none">
+        <a:defRPr sz="2400" b="0" i="0" u="none" strike="noStrike" cap="none" spc="0" baseline="0">
           <a:solidFill>
             <a:schemeClr val="tx1"/>
           </a:solidFill>
@@ -2887,7 +2982,7 @@
 </file>
 
 <file path=ppt/slides/slide1.xml><?xml version="1.0" encoding="utf-8"?>
-<p:sld xmlns:a="http://schemas.openxmlformats.org/drawingml/2006/main" xmlns:r="http://schemas.openxmlformats.org/officeDocument/2006/relationships" xmlns:p="http://schemas.openxmlformats.org/presentationml/2006/main" xmlns:m="http://schemas.openxmlformats.org/officeDocument/2006/math" xmlns:a14="http://schemas.microsoft.com/office/drawing/2010/main" showMasterSp="1" showMasterPhAnim="1">
+<p:sld xmlns:a="http://schemas.openxmlformats.org/drawingml/2006/main" xmlns:r="http://schemas.openxmlformats.org/officeDocument/2006/relationships" xmlns:p="http://schemas.openxmlformats.org/presentationml/2006/main">
   <p:cSld>
     <p:spTree>
       <p:nvGrpSpPr>
@@ -2906,7 +3001,9 @@
       <p:sp>
         <p:nvSpPr>
           <p:cNvPr id="119" name="Thank You, Speaker!"/>
-          <p:cNvSpPr txBox="1"/>
+          <p:cNvSpPr txBox="1">
+            <a:spLocks noGrp="1"/>
+          </p:cNvSpPr>
           <p:nvPr>
             <p:ph type="ctrTitle"/>
           </p:nvPr>
@@ -2924,7 +3021,6 @@
           <a:bodyPr/>
           <a:lstStyle/>
           <a:p>
-            <a:pPr/>
             <a:r>
               <a:t>Thank You, Speaker!</a:t>
             </a:r>
@@ -2933,8 +3029,10 @@
       </p:sp>
       <p:sp>
         <p:nvSpPr>
-          <p:cNvPr id="120" name="Use the following slides in addition to your set to help promote THAT Conference and our awesome partners. Slides two and three can be put before your slide deck, and slide four can be added to the end of your presentation.…"/>
-          <p:cNvSpPr txBox="1"/>
+          <p:cNvPr id="120" name="Use the following slides in addition to your set to help promote THAT Conference and our awesome partners. Slides two and three can be put before your slide deck, and slides four and five can be added to the end of your presentation.…"/>
+          <p:cNvSpPr txBox="1">
+            <a:spLocks noGrp="1"/>
+          </p:cNvSpPr>
           <p:nvPr>
             <p:ph type="subTitle" sz="half" idx="1"/>
           </p:nvPr>
@@ -2952,21 +3050,22 @@
           <a:bodyPr/>
           <a:lstStyle/>
           <a:p>
-            <a:pPr defTabSz="566674">
-              <a:defRPr sz="4268"/>
+            <a:pPr defTabSz="549148">
+              <a:defRPr sz="4136"/>
             </a:pPr>
             <a:r>
-              <a:t>Use the following slides in addition to your set to help promote THAT Conference and our awesome partners. Slides two and three can be put before your slide deck, and slide four can be added to the end of your presentation.</a:t>
+              <a:t>Use the following slides in addition to your set to help promote THAT Conference and our awesome partners. Slides two and three can be put before your slide deck, and slides four and five can be added to the end of your presentation.</a:t>
             </a:r>
           </a:p>
           <a:p>
-            <a:pPr defTabSz="566674">
-              <a:defRPr sz="4268"/>
+            <a:pPr defTabSz="549148">
+              <a:defRPr sz="4136"/>
             </a:pPr>
-          </a:p>
-          <a:p>
-            <a:pPr defTabSz="566674">
-              <a:defRPr sz="4268"/>
+            <a:endParaRPr/>
+          </a:p>
+          <a:p>
+            <a:pPr defTabSz="549148">
+              <a:defRPr sz="4136"/>
             </a:pPr>
             <a:r>
               <a:t>Good luck in your presentation. Looking forward to seeing you at the Kalahari and online at THAT.us!</a:t>
@@ -2979,12 +3078,12 @@
   <p:clrMapOvr>
     <a:masterClrMapping/>
   </p:clrMapOvr>
-  <p:transition xmlns:p14="http://schemas.microsoft.com/office/powerpoint/2010/main" spd="med" advClick="1"/>
+  <p:transition spd="med"/>
 </p:sld>
 </file>
 
 <file path=ppt/slides/slide2.xml><?xml version="1.0" encoding="utf-8"?>
-<p:sld xmlns:a="http://schemas.openxmlformats.org/drawingml/2006/main" xmlns:r="http://schemas.openxmlformats.org/officeDocument/2006/relationships" xmlns:p="http://schemas.openxmlformats.org/presentationml/2006/main" xmlns:m="http://schemas.openxmlformats.org/officeDocument/2006/math" xmlns:a14="http://schemas.microsoft.com/office/drawing/2010/main" showMasterSp="1" showMasterPhAnim="1">
+<p:sld xmlns:a="http://schemas.openxmlformats.org/drawingml/2006/main" xmlns:r="http://schemas.openxmlformats.org/officeDocument/2006/relationships" xmlns:p="http://schemas.openxmlformats.org/presentationml/2006/main">
   <p:cSld>
     <p:spTree>
       <p:nvGrpSpPr>
@@ -3002,7 +3101,13 @@
       </p:grpSpPr>
       <p:pic>
         <p:nvPicPr>
-          <p:cNvPr id="122" name="That-Conference-Branding-Slide.png" descr="That-Conference-Branding-Slide.png"/>
+          <p:cNvPr id="3" name="Picture 2">
+            <a:extLst>
+              <a:ext uri="{FF2B5EF4-FFF2-40B4-BE49-F238E27FC236}">
+                <a16:creationId xmlns:a16="http://schemas.microsoft.com/office/drawing/2014/main" id="{57B3CE82-6F55-EBEC-BBA1-B3F9E3137BC2}"/>
+              </a:ext>
+            </a:extLst>
+          </p:cNvPr>
           <p:cNvPicPr>
             <a:picLocks noChangeAspect="1"/>
           </p:cNvPicPr>
@@ -3010,11 +3115,14 @@
         </p:nvPicPr>
         <p:blipFill>
           <a:blip r:embed="rId2">
-            <a:extLst/>
+            <a:extLst>
+              <a:ext uri="{28A0092B-C50C-407E-A947-70E740481C1C}">
+                <a14:useLocalDpi xmlns:a14="http://schemas.microsoft.com/office/drawing/2010/main" val="0"/>
+              </a:ext>
+            </a:extLst>
           </a:blip>
-          <a:stretch>
-            <a:fillRect/>
-          </a:stretch>
+          <a:srcRect/>
+          <a:stretch/>
         </p:blipFill>
         <p:spPr>
           <a:xfrm>
@@ -3024,9 +3132,6 @@
           <a:prstGeom prst="rect">
             <a:avLst/>
           </a:prstGeom>
-          <a:ln w="12700">
-            <a:miter lim="400000"/>
-          </a:ln>
         </p:spPr>
       </p:pic>
     </p:spTree>
@@ -3034,12 +3139,12 @@
   <p:clrMapOvr>
     <a:masterClrMapping/>
   </p:clrMapOvr>
-  <p:transition xmlns:p14="http://schemas.microsoft.com/office/powerpoint/2010/main" spd="med" advClick="1"/>
+  <p:transition spd="med"/>
 </p:sld>
 </file>
 
 <file path=ppt/slides/slide3.xml><?xml version="1.0" encoding="utf-8"?>
-<p:sld xmlns:a="http://schemas.openxmlformats.org/drawingml/2006/main" xmlns:r="http://schemas.openxmlformats.org/officeDocument/2006/relationships" xmlns:p="http://schemas.openxmlformats.org/presentationml/2006/main" xmlns:m="http://schemas.openxmlformats.org/officeDocument/2006/math" xmlns:a14="http://schemas.microsoft.com/office/drawing/2010/main" showMasterSp="1" showMasterPhAnim="1">
+<p:sld xmlns:a="http://schemas.openxmlformats.org/drawingml/2006/main" xmlns:r="http://schemas.openxmlformats.org/officeDocument/2006/relationships" xmlns:p="http://schemas.openxmlformats.org/presentationml/2006/main">
   <p:cSld>
     <p:spTree>
       <p:nvGrpSpPr>
@@ -3057,7 +3162,13 @@
       </p:grpSpPr>
       <p:pic>
         <p:nvPicPr>
-          <p:cNvPr id="124" name="That-Conference-Partners-Slide.png" descr="That-Conference-Partners-Slide.png"/>
+          <p:cNvPr id="3" name="Picture 2">
+            <a:extLst>
+              <a:ext uri="{FF2B5EF4-FFF2-40B4-BE49-F238E27FC236}">
+                <a16:creationId xmlns:a16="http://schemas.microsoft.com/office/drawing/2014/main" id="{55099A0A-6D18-20CD-CB56-45DF6A798F10}"/>
+              </a:ext>
+            </a:extLst>
+          </p:cNvPr>
           <p:cNvPicPr>
             <a:picLocks noChangeAspect="1"/>
           </p:cNvPicPr>
@@ -3065,11 +3176,14 @@
         </p:nvPicPr>
         <p:blipFill>
           <a:blip r:embed="rId2">
-            <a:extLst/>
+            <a:extLst>
+              <a:ext uri="{28A0092B-C50C-407E-A947-70E740481C1C}">
+                <a14:useLocalDpi xmlns:a14="http://schemas.microsoft.com/office/drawing/2010/main" val="0"/>
+              </a:ext>
+            </a:extLst>
           </a:blip>
-          <a:stretch>
-            <a:fillRect/>
-          </a:stretch>
+          <a:srcRect/>
+          <a:stretch/>
         </p:blipFill>
         <p:spPr>
           <a:xfrm>
@@ -3079,9 +3193,6 @@
           <a:prstGeom prst="rect">
             <a:avLst/>
           </a:prstGeom>
-          <a:ln w="12700">
-            <a:miter lim="400000"/>
-          </a:ln>
         </p:spPr>
       </p:pic>
     </p:spTree>
@@ -3089,12 +3200,12 @@
   <p:clrMapOvr>
     <a:masterClrMapping/>
   </p:clrMapOvr>
-  <p:transition xmlns:p14="http://schemas.microsoft.com/office/powerpoint/2010/main" spd="med" advClick="1"/>
+  <p:transition spd="med"/>
 </p:sld>
 </file>
 
 <file path=ppt/slides/slide4.xml><?xml version="1.0" encoding="utf-8"?>
-<p:sld xmlns:a="http://schemas.openxmlformats.org/drawingml/2006/main" xmlns:r="http://schemas.openxmlformats.org/officeDocument/2006/relationships" xmlns:p="http://schemas.openxmlformats.org/presentationml/2006/main" xmlns:m="http://schemas.openxmlformats.org/officeDocument/2006/math" xmlns:a14="http://schemas.microsoft.com/office/drawing/2010/main" showMasterSp="1" showMasterPhAnim="1">
+<p:sld xmlns:a="http://schemas.openxmlformats.org/drawingml/2006/main" xmlns:r="http://schemas.openxmlformats.org/officeDocument/2006/relationships" xmlns:p="http://schemas.openxmlformats.org/presentationml/2006/main">
   <p:cSld>
     <p:spTree>
       <p:nvGrpSpPr>
@@ -3112,7 +3223,13 @@
       </p:grpSpPr>
       <p:pic>
         <p:nvPicPr>
-          <p:cNvPr id="126" name="THAT.us.png" descr="THAT.us.png"/>
+          <p:cNvPr id="5" name="Picture 4">
+            <a:extLst>
+              <a:ext uri="{FF2B5EF4-FFF2-40B4-BE49-F238E27FC236}">
+                <a16:creationId xmlns:a16="http://schemas.microsoft.com/office/drawing/2014/main" id="{38B68C0E-1CBC-25C6-E96C-911E3F395CB3}"/>
+              </a:ext>
+            </a:extLst>
+          </p:cNvPr>
           <p:cNvPicPr>
             <a:picLocks noChangeAspect="1"/>
           </p:cNvPicPr>
@@ -3120,11 +3237,14 @@
         </p:nvPicPr>
         <p:blipFill>
           <a:blip r:embed="rId2">
-            <a:extLst/>
+            <a:extLst>
+              <a:ext uri="{28A0092B-C50C-407E-A947-70E740481C1C}">
+                <a14:useLocalDpi xmlns:a14="http://schemas.microsoft.com/office/drawing/2010/main" val="0"/>
+              </a:ext>
+            </a:extLst>
           </a:blip>
-          <a:stretch>
-            <a:fillRect/>
-          </a:stretch>
+          <a:srcRect/>
+          <a:stretch/>
         </p:blipFill>
         <p:spPr>
           <a:xfrm>
@@ -3134,9 +3254,6 @@
           <a:prstGeom prst="rect">
             <a:avLst/>
           </a:prstGeom>
-          <a:ln w="12700">
-            <a:miter lim="400000"/>
-          </a:ln>
         </p:spPr>
       </p:pic>
     </p:spTree>
@@ -3144,12 +3261,73 @@
   <p:clrMapOvr>
     <a:masterClrMapping/>
   </p:clrMapOvr>
-  <p:transition xmlns:p14="http://schemas.microsoft.com/office/powerpoint/2010/main" spd="med" advClick="1"/>
+  <p:transition spd="med"/>
+</p:sld>
+</file>
+
+<file path=ppt/slides/slide5.xml><?xml version="1.0" encoding="utf-8"?>
+<p:sld xmlns:a="http://schemas.openxmlformats.org/drawingml/2006/main" xmlns:r="http://schemas.openxmlformats.org/officeDocument/2006/relationships" xmlns:p="http://schemas.openxmlformats.org/presentationml/2006/main">
+  <p:cSld>
+    <p:spTree>
+      <p:nvGrpSpPr>
+        <p:cNvPr id="1" name=""/>
+        <p:cNvGrpSpPr/>
+        <p:nvPr/>
+      </p:nvGrpSpPr>
+      <p:grpSpPr>
+        <a:xfrm>
+          <a:off x="0" y="0"/>
+          <a:ext cx="0" cy="0"/>
+          <a:chOff x="0" y="0"/>
+          <a:chExt cx="0" cy="0"/>
+        </a:xfrm>
+      </p:grpSpPr>
+      <p:pic>
+        <p:nvPicPr>
+          <p:cNvPr id="3" name="Picture 2">
+            <a:extLst>
+              <a:ext uri="{FF2B5EF4-FFF2-40B4-BE49-F238E27FC236}">
+                <a16:creationId xmlns:a16="http://schemas.microsoft.com/office/drawing/2014/main" id="{3760322D-C7F9-59CC-17B7-41FB6E98610A}"/>
+              </a:ext>
+            </a:extLst>
+          </p:cNvPr>
+          <p:cNvPicPr>
+            <a:picLocks noChangeAspect="1"/>
+          </p:cNvPicPr>
+          <p:nvPr/>
+        </p:nvPicPr>
+        <p:blipFill>
+          <a:blip r:embed="rId2">
+            <a:extLst>
+              <a:ext uri="{28A0092B-C50C-407E-A947-70E740481C1C}">
+                <a14:useLocalDpi xmlns:a14="http://schemas.microsoft.com/office/drawing/2010/main" val="0"/>
+              </a:ext>
+            </a:extLst>
+          </a:blip>
+          <a:srcRect/>
+          <a:stretch/>
+        </p:blipFill>
+        <p:spPr>
+          <a:xfrm>
+            <a:off x="0" y="0"/>
+            <a:ext cx="24384000" cy="13716000"/>
+          </a:xfrm>
+          <a:prstGeom prst="rect">
+            <a:avLst/>
+          </a:prstGeom>
+        </p:spPr>
+      </p:pic>
+    </p:spTree>
+  </p:cSld>
+  <p:clrMapOvr>
+    <a:masterClrMapping/>
+  </p:clrMapOvr>
+  <p:transition spd="med"/>
 </p:sld>
 </file>
 
 <file path=ppt/theme/theme1.xml><?xml version="1.0" encoding="utf-8"?>
-<a:theme xmlns:a="http://schemas.openxmlformats.org/drawingml/2006/main" xmlns:r="http://schemas.openxmlformats.org/officeDocument/2006/relationships" name="White">
+<a:theme xmlns:a="http://schemas.openxmlformats.org/drawingml/2006/main" name="White">
   <a:themeElements>
     <a:clrScheme name="White">
       <a:dk1>
@@ -3275,7 +3453,7 @@
       <a:effectStyleLst>
         <a:effectStyle>
           <a:effectLst>
-            <a:outerShdw sx="100000" sy="100000" kx="0" ky="0" algn="b" rotWithShape="0" blurRad="50800" dist="25400" dir="5400000">
+            <a:outerShdw blurRad="50800" dist="25400" dir="5400000" rotWithShape="0">
               <a:srgbClr val="000000">
                 <a:alpha val="50000"/>
               </a:srgbClr>
@@ -3284,7 +3462,7 @@
         </a:effectStyle>
         <a:effectStyle>
           <a:effectLst>
-            <a:outerShdw sx="100000" sy="100000" kx="0" ky="0" algn="b" rotWithShape="0" blurRad="63500" dist="12700" dir="0">
+            <a:outerShdw blurRad="63500" dist="12700" rotWithShape="0">
               <a:srgbClr val="000000">
                 <a:alpha val="50000"/>
               </a:srgbClr>
@@ -3293,7 +3471,7 @@
         </a:effectStyle>
         <a:effectStyle>
           <a:effectLst>
-            <a:outerShdw sx="100000" sy="100000" kx="0" ky="0" algn="b" rotWithShape="0" blurRad="50800" dist="25400" dir="5400000">
+            <a:outerShdw blurRad="50800" dist="25400" dir="5400000" rotWithShape="0">
               <a:srgbClr val="000000">
                 <a:alpha val="50000"/>
               </a:srgbClr>
@@ -3357,8 +3535,8 @@
     <a:spDef>
       <a:spPr>
         <a:blipFill rotWithShape="1">
-          <a:blip r:embed="rId1"/>
-          <a:srcRect l="0" t="0" r="0" b="0"/>
+          <a:blip xmlns:r="http://schemas.openxmlformats.org/officeDocument/2006/relationships" r:embed="rId1"/>
+          <a:srcRect/>
           <a:tile tx="0" ty="0" sx="100000" sy="100000" flip="none" algn="tl"/>
         </a:blipFill>
         <a:ln w="12700" cap="flat">
@@ -3366,7 +3544,7 @@
           <a:miter lim="400000"/>
         </a:ln>
         <a:effectLst>
-          <a:outerShdw sx="100000" sy="100000" kx="0" ky="0" algn="b" rotWithShape="0" blurRad="50800" dist="25400" dir="5400000">
+          <a:outerShdw blurRad="50800" dist="25400" dir="5400000" rotWithShape="0">
             <a:srgbClr val="000000">
               <a:alpha val="50000"/>
             </a:srgbClr>
@@ -3374,7 +3552,7 @@
         </a:effectLst>
         <a:sp3d/>
       </a:spPr>
-      <a:bodyPr rot="0" spcFirstLastPara="1" vertOverflow="overflow" horzOverflow="overflow" vert="horz" wrap="square" lIns="71437" tIns="71437" rIns="71437" bIns="71437" numCol="1" spcCol="38100" rtlCol="0" anchor="ctr" upright="0">
+      <a:bodyPr rot="0" spcFirstLastPara="1" vertOverflow="overflow" horzOverflow="overflow" vert="horz" wrap="square" lIns="71437" tIns="71437" rIns="71437" bIns="71437" numCol="1" spcCol="38100" rtlCol="0" anchor="ctr">
         <a:spAutoFit/>
       </a:bodyPr>
       <a:lstStyle>
@@ -3393,7 +3571,7 @@
           <a:buFontTx/>
           <a:buNone/>
           <a:tabLst/>
-          <a:defRPr b="0" baseline="0" cap="none" i="0" spc="0" strike="noStrike" sz="3200" u="none" kumimoji="0" normalizeH="0">
+          <a:defRPr kumimoji="0" sz="3200" b="0" i="0" u="none" strike="noStrike" cap="none" spc="0" normalizeH="0" baseline="0">
             <a:ln>
               <a:noFill/>
             </a:ln>
@@ -3423,7 +3601,7 @@
           <a:buFontTx/>
           <a:buNone/>
           <a:tabLst/>
-          <a:defRPr b="0" baseline="0" cap="none" i="0" spc="0" strike="noStrike" sz="1800" u="none" kumimoji="0" normalizeH="0">
+          <a:defRPr kumimoji="0" sz="1800" b="0" i="0" u="none" strike="noStrike" cap="none" spc="0" normalizeH="0" baseline="0">
             <a:ln>
               <a:noFill/>
             </a:ln>
@@ -3449,7 +3627,7 @@
           <a:buFontTx/>
           <a:buNone/>
           <a:tabLst/>
-          <a:defRPr b="0" baseline="0" cap="none" i="0" spc="0" strike="noStrike" sz="1800" u="none" kumimoji="0" normalizeH="0">
+          <a:defRPr kumimoji="0" sz="1800" b="0" i="0" u="none" strike="noStrike" cap="none" spc="0" normalizeH="0" baseline="0">
             <a:ln>
               <a:noFill/>
             </a:ln>
@@ -3475,7 +3653,7 @@
           <a:buFontTx/>
           <a:buNone/>
           <a:tabLst/>
-          <a:defRPr b="0" baseline="0" cap="none" i="0" spc="0" strike="noStrike" sz="1800" u="none" kumimoji="0" normalizeH="0">
+          <a:defRPr kumimoji="0" sz="1800" b="0" i="0" u="none" strike="noStrike" cap="none" spc="0" normalizeH="0" baseline="0">
             <a:ln>
               <a:noFill/>
             </a:ln>
@@ -3501,7 +3679,7 @@
           <a:buFontTx/>
           <a:buNone/>
           <a:tabLst/>
-          <a:defRPr b="0" baseline="0" cap="none" i="0" spc="0" strike="noStrike" sz="1800" u="none" kumimoji="0" normalizeH="0">
+          <a:defRPr kumimoji="0" sz="1800" b="0" i="0" u="none" strike="noStrike" cap="none" spc="0" normalizeH="0" baseline="0">
             <a:ln>
               <a:noFill/>
             </a:ln>
@@ -3527,7 +3705,7 @@
           <a:buFontTx/>
           <a:buNone/>
           <a:tabLst/>
-          <a:defRPr b="0" baseline="0" cap="none" i="0" spc="0" strike="noStrike" sz="1800" u="none" kumimoji="0" normalizeH="0">
+          <a:defRPr kumimoji="0" sz="1800" b="0" i="0" u="none" strike="noStrike" cap="none" spc="0" normalizeH="0" baseline="0">
             <a:ln>
               <a:noFill/>
             </a:ln>
@@ -3553,7 +3731,7 @@
           <a:buFontTx/>
           <a:buNone/>
           <a:tabLst/>
-          <a:defRPr b="0" baseline="0" cap="none" i="0" spc="0" strike="noStrike" sz="1800" u="none" kumimoji="0" normalizeH="0">
+          <a:defRPr kumimoji="0" sz="1800" b="0" i="0" u="none" strike="noStrike" cap="none" spc="0" normalizeH="0" baseline="0">
             <a:ln>
               <a:noFill/>
             </a:ln>
@@ -3579,7 +3757,7 @@
           <a:buFontTx/>
           <a:buNone/>
           <a:tabLst/>
-          <a:defRPr b="0" baseline="0" cap="none" i="0" spc="0" strike="noStrike" sz="1800" u="none" kumimoji="0" normalizeH="0">
+          <a:defRPr kumimoji="0" sz="1800" b="0" i="0" u="none" strike="noStrike" cap="none" spc="0" normalizeH="0" baseline="0">
             <a:ln>
               <a:noFill/>
             </a:ln>
@@ -3605,7 +3783,7 @@
           <a:buFontTx/>
           <a:buNone/>
           <a:tabLst/>
-          <a:defRPr b="0" baseline="0" cap="none" i="0" spc="0" strike="noStrike" sz="1800" u="none" kumimoji="0" normalizeH="0">
+          <a:defRPr kumimoji="0" sz="1800" b="0" i="0" u="none" strike="noStrike" cap="none" spc="0" normalizeH="0" baseline="0">
             <a:ln>
               <a:noFill/>
             </a:ln>
@@ -3631,7 +3809,7 @@
           <a:buFontTx/>
           <a:buNone/>
           <a:tabLst/>
-          <a:defRPr b="0" baseline="0" cap="none" i="0" spc="0" strike="noStrike" sz="1800" u="none" kumimoji="0" normalizeH="0">
+          <a:defRPr kumimoji="0" sz="1800" b="0" i="0" u="none" strike="noStrike" cap="none" spc="0" normalizeH="0" baseline="0">
             <a:ln>
               <a:noFill/>
             </a:ln>
@@ -3644,9 +3822,15 @@
         </a:lvl9pPr>
       </a:lstStyle>
       <a:style>
-        <a:lnRef idx="0"/>
-        <a:fillRef idx="0"/>
-        <a:effectRef idx="0"/>
+        <a:lnRef idx="0">
+          <a:scrgbClr r="0" g="0" b="0"/>
+        </a:lnRef>
+        <a:fillRef idx="0">
+          <a:scrgbClr r="0" g="0" b="0"/>
+        </a:fillRef>
+        <a:effectRef idx="0">
+          <a:scrgbClr r="0" g="0" b="0"/>
+        </a:effectRef>
         <a:fontRef idx="none"/>
       </a:style>
     </a:spDef>
@@ -3663,7 +3847,7 @@
         <a:effectLst/>
         <a:sp3d/>
       </a:spPr>
-      <a:bodyPr rot="0" spcFirstLastPara="1" vertOverflow="overflow" horzOverflow="overflow" vert="horz" wrap="square" lIns="91439" tIns="45719" rIns="91439" bIns="45719" numCol="1" spcCol="38100" rtlCol="0" anchor="t" upright="0">
+      <a:bodyPr rot="0" spcFirstLastPara="1" vertOverflow="overflow" horzOverflow="overflow" vert="horz" wrap="square" lIns="91439" tIns="45719" rIns="91439" bIns="45719" numCol="1" spcCol="38100" rtlCol="0" anchor="t">
         <a:noAutofit/>
       </a:bodyPr>
       <a:lstStyle>
@@ -3682,7 +3866,7 @@
           <a:buFontTx/>
           <a:buNone/>
           <a:tabLst/>
-          <a:defRPr b="0" baseline="0" cap="none" i="0" spc="0" strike="noStrike" sz="1800" u="none" kumimoji="0" normalizeH="0">
+          <a:defRPr kumimoji="0" sz="1800" b="0" i="0" u="none" strike="noStrike" cap="none" spc="0" normalizeH="0" baseline="0">
             <a:ln>
               <a:noFill/>
             </a:ln>
@@ -3708,7 +3892,7 @@
           <a:buFontTx/>
           <a:buNone/>
           <a:tabLst/>
-          <a:defRPr b="0" baseline="0" cap="none" i="0" spc="0" strike="noStrike" sz="1800" u="none" kumimoji="0" normalizeH="0">
+          <a:defRPr kumimoji="0" sz="1800" b="0" i="0" u="none" strike="noStrike" cap="none" spc="0" normalizeH="0" baseline="0">
             <a:ln>
               <a:noFill/>
             </a:ln>
@@ -3734,7 +3918,7 @@
           <a:buFontTx/>
           <a:buNone/>
           <a:tabLst/>
-          <a:defRPr b="0" baseline="0" cap="none" i="0" spc="0" strike="noStrike" sz="1800" u="none" kumimoji="0" normalizeH="0">
+          <a:defRPr kumimoji="0" sz="1800" b="0" i="0" u="none" strike="noStrike" cap="none" spc="0" normalizeH="0" baseline="0">
             <a:ln>
               <a:noFill/>
             </a:ln>
@@ -3760,7 +3944,7 @@
           <a:buFontTx/>
           <a:buNone/>
           <a:tabLst/>
-          <a:defRPr b="0" baseline="0" cap="none" i="0" spc="0" strike="noStrike" sz="1800" u="none" kumimoji="0" normalizeH="0">
+          <a:defRPr kumimoji="0" sz="1800" b="0" i="0" u="none" strike="noStrike" cap="none" spc="0" normalizeH="0" baseline="0">
             <a:ln>
               <a:noFill/>
             </a:ln>
@@ -3786,7 +3970,7 @@
           <a:buFontTx/>
           <a:buNone/>
           <a:tabLst/>
-          <a:defRPr b="0" baseline="0" cap="none" i="0" spc="0" strike="noStrike" sz="1800" u="none" kumimoji="0" normalizeH="0">
+          <a:defRPr kumimoji="0" sz="1800" b="0" i="0" u="none" strike="noStrike" cap="none" spc="0" normalizeH="0" baseline="0">
             <a:ln>
               <a:noFill/>
             </a:ln>
@@ -3812,7 +3996,7 @@
           <a:buFontTx/>
           <a:buNone/>
           <a:tabLst/>
-          <a:defRPr b="0" baseline="0" cap="none" i="0" spc="0" strike="noStrike" sz="1800" u="none" kumimoji="0" normalizeH="0">
+          <a:defRPr kumimoji="0" sz="1800" b="0" i="0" u="none" strike="noStrike" cap="none" spc="0" normalizeH="0" baseline="0">
             <a:ln>
               <a:noFill/>
             </a:ln>
@@ -3838,7 +4022,7 @@
           <a:buFontTx/>
           <a:buNone/>
           <a:tabLst/>
-          <a:defRPr b="0" baseline="0" cap="none" i="0" spc="0" strike="noStrike" sz="1800" u="none" kumimoji="0" normalizeH="0">
+          <a:defRPr kumimoji="0" sz="1800" b="0" i="0" u="none" strike="noStrike" cap="none" spc="0" normalizeH="0" baseline="0">
             <a:ln>
               <a:noFill/>
             </a:ln>
@@ -3864,7 +4048,7 @@
           <a:buFontTx/>
           <a:buNone/>
           <a:tabLst/>
-          <a:defRPr b="0" baseline="0" cap="none" i="0" spc="0" strike="noStrike" sz="1800" u="none" kumimoji="0" normalizeH="0">
+          <a:defRPr kumimoji="0" sz="1800" b="0" i="0" u="none" strike="noStrike" cap="none" spc="0" normalizeH="0" baseline="0">
             <a:ln>
               <a:noFill/>
             </a:ln>
@@ -3890,7 +4074,7 @@
           <a:buFontTx/>
           <a:buNone/>
           <a:tabLst/>
-          <a:defRPr b="0" baseline="0" cap="none" i="0" spc="0" strike="noStrike" sz="1800" u="none" kumimoji="0" normalizeH="0">
+          <a:defRPr kumimoji="0" sz="1800" b="0" i="0" u="none" strike="noStrike" cap="none" spc="0" normalizeH="0" baseline="0">
             <a:ln>
               <a:noFill/>
             </a:ln>
@@ -3916,7 +4100,7 @@
           <a:buFontTx/>
           <a:buNone/>
           <a:tabLst/>
-          <a:defRPr b="0" baseline="0" cap="none" i="0" spc="0" strike="noStrike" sz="1800" u="none" kumimoji="0" normalizeH="0">
+          <a:defRPr kumimoji="0" sz="1800" b="0" i="0" u="none" strike="noStrike" cap="none" spc="0" normalizeH="0" baseline="0">
             <a:ln>
               <a:noFill/>
             </a:ln>
@@ -3929,9 +4113,15 @@
         </a:lvl9pPr>
       </a:lstStyle>
       <a:style>
-        <a:lnRef idx="0"/>
-        <a:fillRef idx="0"/>
-        <a:effectRef idx="0"/>
+        <a:lnRef idx="0">
+          <a:scrgbClr r="0" g="0" b="0"/>
+        </a:lnRef>
+        <a:fillRef idx="0">
+          <a:scrgbClr r="0" g="0" b="0"/>
+        </a:fillRef>
+        <a:effectRef idx="0">
+          <a:scrgbClr r="0" g="0" b="0"/>
+        </a:effectRef>
         <a:fontRef idx="none"/>
       </a:style>
     </a:lnDef>
@@ -3945,7 +4135,7 @@
         <a:effectLst/>
         <a:sp3d/>
       </a:spPr>
-      <a:bodyPr rot="0" spcFirstLastPara="1" vertOverflow="overflow" horzOverflow="overflow" vert="horz" wrap="square" lIns="71437" tIns="71437" rIns="71437" bIns="71437" numCol="1" spcCol="38100" rtlCol="0" anchor="ctr" upright="0">
+      <a:bodyPr rot="0" spcFirstLastPara="1" vertOverflow="overflow" horzOverflow="overflow" vert="horz" wrap="square" lIns="71437" tIns="71437" rIns="71437" bIns="71437" numCol="1" spcCol="38100" rtlCol="0" anchor="ctr">
         <a:spAutoFit/>
       </a:bodyPr>
       <a:lstStyle>
@@ -3964,7 +4154,7 @@
           <a:buFontTx/>
           <a:buNone/>
           <a:tabLst/>
-          <a:defRPr b="0" baseline="0" cap="none" i="0" spc="0" strike="noStrike" sz="5000" u="none" kumimoji="0" normalizeH="0">
+          <a:defRPr kumimoji="0" sz="5000" b="0" i="0" u="none" strike="noStrike" cap="none" spc="0" normalizeH="0" baseline="0">
             <a:ln>
               <a:noFill/>
             </a:ln>
@@ -3994,7 +4184,7 @@
           <a:buFontTx/>
           <a:buNone/>
           <a:tabLst/>
-          <a:defRPr b="0" baseline="0" cap="none" i="0" spc="0" strike="noStrike" sz="1800" u="none" kumimoji="0" normalizeH="0">
+          <a:defRPr kumimoji="0" sz="1800" b="0" i="0" u="none" strike="noStrike" cap="none" spc="0" normalizeH="0" baseline="0">
             <a:ln>
               <a:noFill/>
             </a:ln>
@@ -4020,7 +4210,7 @@
           <a:buFontTx/>
           <a:buNone/>
           <a:tabLst/>
-          <a:defRPr b="0" baseline="0" cap="none" i="0" spc="0" strike="noStrike" sz="1800" u="none" kumimoji="0" normalizeH="0">
+          <a:defRPr kumimoji="0" sz="1800" b="0" i="0" u="none" strike="noStrike" cap="none" spc="0" normalizeH="0" baseline="0">
             <a:ln>
               <a:noFill/>
             </a:ln>
@@ -4046,7 +4236,7 @@
           <a:buFontTx/>
           <a:buNone/>
           <a:tabLst/>
-          <a:defRPr b="0" baseline="0" cap="none" i="0" spc="0" strike="noStrike" sz="1800" u="none" kumimoji="0" normalizeH="0">
+          <a:defRPr kumimoji="0" sz="1800" b="0" i="0" u="none" strike="noStrike" cap="none" spc="0" normalizeH="0" baseline="0">
             <a:ln>
               <a:noFill/>
             </a:ln>
@@ -4072,7 +4262,7 @@
           <a:buFontTx/>
           <a:buNone/>
           <a:tabLst/>
-          <a:defRPr b="0" baseline="0" cap="none" i="0" spc="0" strike="noStrike" sz="1800" u="none" kumimoji="0" normalizeH="0">
+          <a:defRPr kumimoji="0" sz="1800" b="0" i="0" u="none" strike="noStrike" cap="none" spc="0" normalizeH="0" baseline="0">
             <a:ln>
               <a:noFill/>
             </a:ln>
@@ -4098,7 +4288,7 @@
           <a:buFontTx/>
           <a:buNone/>
           <a:tabLst/>
-          <a:defRPr b="0" baseline="0" cap="none" i="0" spc="0" strike="noStrike" sz="1800" u="none" kumimoji="0" normalizeH="0">
+          <a:defRPr kumimoji="0" sz="1800" b="0" i="0" u="none" strike="noStrike" cap="none" spc="0" normalizeH="0" baseline="0">
             <a:ln>
               <a:noFill/>
             </a:ln>
@@ -4124,7 +4314,7 @@
           <a:buFontTx/>
           <a:buNone/>
           <a:tabLst/>
-          <a:defRPr b="0" baseline="0" cap="none" i="0" spc="0" strike="noStrike" sz="1800" u="none" kumimoji="0" normalizeH="0">
+          <a:defRPr kumimoji="0" sz="1800" b="0" i="0" u="none" strike="noStrike" cap="none" spc="0" normalizeH="0" baseline="0">
             <a:ln>
               <a:noFill/>
             </a:ln>
@@ -4150,7 +4340,7 @@
           <a:buFontTx/>
           <a:buNone/>
           <a:tabLst/>
-          <a:defRPr b="0" baseline="0" cap="none" i="0" spc="0" strike="noStrike" sz="1800" u="none" kumimoji="0" normalizeH="0">
+          <a:defRPr kumimoji="0" sz="1800" b="0" i="0" u="none" strike="noStrike" cap="none" spc="0" normalizeH="0" baseline="0">
             <a:ln>
               <a:noFill/>
             </a:ln>
@@ -4176,7 +4366,7 @@
           <a:buFontTx/>
           <a:buNone/>
           <a:tabLst/>
-          <a:defRPr b="0" baseline="0" cap="none" i="0" spc="0" strike="noStrike" sz="1800" u="none" kumimoji="0" normalizeH="0">
+          <a:defRPr kumimoji="0" sz="1800" b="0" i="0" u="none" strike="noStrike" cap="none" spc="0" normalizeH="0" baseline="0">
             <a:ln>
               <a:noFill/>
             </a:ln>
@@ -4202,7 +4392,7 @@
           <a:buFontTx/>
           <a:buNone/>
           <a:tabLst/>
-          <a:defRPr b="0" baseline="0" cap="none" i="0" spc="0" strike="noStrike" sz="1800" u="none" kumimoji="0" normalizeH="0">
+          <a:defRPr kumimoji="0" sz="1800" b="0" i="0" u="none" strike="noStrike" cap="none" spc="0" normalizeH="0" baseline="0">
             <a:ln>
               <a:noFill/>
             </a:ln>
@@ -4215,18 +4405,25 @@
         </a:lvl9pPr>
       </a:lstStyle>
       <a:style>
-        <a:lnRef idx="0"/>
-        <a:fillRef idx="0"/>
-        <a:effectRef idx="0"/>
+        <a:lnRef idx="0">
+          <a:scrgbClr r="0" g="0" b="0"/>
+        </a:lnRef>
+        <a:fillRef idx="0">
+          <a:scrgbClr r="0" g="0" b="0"/>
+        </a:fillRef>
+        <a:effectRef idx="0">
+          <a:scrgbClr r="0" g="0" b="0"/>
+        </a:effectRef>
         <a:fontRef idx="none"/>
       </a:style>
     </a:txDef>
   </a:objectDefaults>
+  <a:extraClrSchemeLst/>
 </a:theme>
 </file>
 
 <file path=ppt/theme/theme2.xml><?xml version="1.0" encoding="utf-8"?>
-<a:theme xmlns:a="http://schemas.openxmlformats.org/drawingml/2006/main" xmlns:r="http://schemas.openxmlformats.org/officeDocument/2006/relationships" name="White">
+<a:theme xmlns:a="http://schemas.openxmlformats.org/drawingml/2006/main" name="White">
   <a:themeElements>
     <a:clrScheme name="White">
       <a:dk1>
@@ -4352,7 +4549,7 @@
       <a:effectStyleLst>
         <a:effectStyle>
           <a:effectLst>
-            <a:outerShdw sx="100000" sy="100000" kx="0" ky="0" algn="b" rotWithShape="0" blurRad="50800" dist="25400" dir="5400000">
+            <a:outerShdw blurRad="50800" dist="25400" dir="5400000" rotWithShape="0">
               <a:srgbClr val="000000">
                 <a:alpha val="50000"/>
               </a:srgbClr>
@@ -4361,7 +4558,7 @@
         </a:effectStyle>
         <a:effectStyle>
           <a:effectLst>
-            <a:outerShdw sx="100000" sy="100000" kx="0" ky="0" algn="b" rotWithShape="0" blurRad="63500" dist="12700" dir="0">
+            <a:outerShdw blurRad="63500" dist="12700" rotWithShape="0">
               <a:srgbClr val="000000">
                 <a:alpha val="50000"/>
               </a:srgbClr>
@@ -4370,7 +4567,7 @@
         </a:effectStyle>
         <a:effectStyle>
           <a:effectLst>
-            <a:outerShdw sx="100000" sy="100000" kx="0" ky="0" algn="b" rotWithShape="0" blurRad="50800" dist="25400" dir="5400000">
+            <a:outerShdw blurRad="50800" dist="25400" dir="5400000" rotWithShape="0">
               <a:srgbClr val="000000">
                 <a:alpha val="50000"/>
               </a:srgbClr>
@@ -4434,8 +4631,8 @@
     <a:spDef>
       <a:spPr>
         <a:blipFill rotWithShape="1">
-          <a:blip r:embed="rId1"/>
-          <a:srcRect l="0" t="0" r="0" b="0"/>
+          <a:blip xmlns:r="http://schemas.openxmlformats.org/officeDocument/2006/relationships" r:embed="rId1"/>
+          <a:srcRect/>
           <a:tile tx="0" ty="0" sx="100000" sy="100000" flip="none" algn="tl"/>
         </a:blipFill>
         <a:ln w="12700" cap="flat">
@@ -4443,7 +4640,7 @@
           <a:miter lim="400000"/>
         </a:ln>
         <a:effectLst>
-          <a:outerShdw sx="100000" sy="100000" kx="0" ky="0" algn="b" rotWithShape="0" blurRad="50800" dist="25400" dir="5400000">
+          <a:outerShdw blurRad="50800" dist="25400" dir="5400000" rotWithShape="0">
             <a:srgbClr val="000000">
               <a:alpha val="50000"/>
             </a:srgbClr>
@@ -4451,7 +4648,7 @@
         </a:effectLst>
         <a:sp3d/>
       </a:spPr>
-      <a:bodyPr rot="0" spcFirstLastPara="1" vertOverflow="overflow" horzOverflow="overflow" vert="horz" wrap="square" lIns="71437" tIns="71437" rIns="71437" bIns="71437" numCol="1" spcCol="38100" rtlCol="0" anchor="ctr" upright="0">
+      <a:bodyPr rot="0" spcFirstLastPara="1" vertOverflow="overflow" horzOverflow="overflow" vert="horz" wrap="square" lIns="71437" tIns="71437" rIns="71437" bIns="71437" numCol="1" spcCol="38100" rtlCol="0" anchor="ctr">
         <a:spAutoFit/>
       </a:bodyPr>
       <a:lstStyle>
@@ -4470,7 +4667,7 @@
           <a:buFontTx/>
           <a:buNone/>
           <a:tabLst/>
-          <a:defRPr b="0" baseline="0" cap="none" i="0" spc="0" strike="noStrike" sz="3200" u="none" kumimoji="0" normalizeH="0">
+          <a:defRPr kumimoji="0" sz="3200" b="0" i="0" u="none" strike="noStrike" cap="none" spc="0" normalizeH="0" baseline="0">
             <a:ln>
               <a:noFill/>
             </a:ln>
@@ -4500,7 +4697,7 @@
           <a:buFontTx/>
           <a:buNone/>
           <a:tabLst/>
-          <a:defRPr b="0" baseline="0" cap="none" i="0" spc="0" strike="noStrike" sz="1800" u="none" kumimoji="0" normalizeH="0">
+          <a:defRPr kumimoji="0" sz="1800" b="0" i="0" u="none" strike="noStrike" cap="none" spc="0" normalizeH="0" baseline="0">
             <a:ln>
               <a:noFill/>
             </a:ln>
@@ -4526,7 +4723,7 @@
           <a:buFontTx/>
           <a:buNone/>
           <a:tabLst/>
-          <a:defRPr b="0" baseline="0" cap="none" i="0" spc="0" strike="noStrike" sz="1800" u="none" kumimoji="0" normalizeH="0">
+          <a:defRPr kumimoji="0" sz="1800" b="0" i="0" u="none" strike="noStrike" cap="none" spc="0" normalizeH="0" baseline="0">
             <a:ln>
               <a:noFill/>
             </a:ln>
@@ -4552,7 +4749,7 @@
           <a:buFontTx/>
           <a:buNone/>
           <a:tabLst/>
-          <a:defRPr b="0" baseline="0" cap="none" i="0" spc="0" strike="noStrike" sz="1800" u="none" kumimoji="0" normalizeH="0">
+          <a:defRPr kumimoji="0" sz="1800" b="0" i="0" u="none" strike="noStrike" cap="none" spc="0" normalizeH="0" baseline="0">
             <a:ln>
               <a:noFill/>
             </a:ln>
@@ -4578,7 +4775,7 @@
           <a:buFontTx/>
           <a:buNone/>
           <a:tabLst/>
-          <a:defRPr b="0" baseline="0" cap="none" i="0" spc="0" strike="noStrike" sz="1800" u="none" kumimoji="0" normalizeH="0">
+          <a:defRPr kumimoji="0" sz="1800" b="0" i="0" u="none" strike="noStrike" cap="none" spc="0" normalizeH="0" baseline="0">
             <a:ln>
               <a:noFill/>
             </a:ln>
@@ -4604,7 +4801,7 @@
           <a:buFontTx/>
           <a:buNone/>
           <a:tabLst/>
-          <a:defRPr b="0" baseline="0" cap="none" i="0" spc="0" strike="noStrike" sz="1800" u="none" kumimoji="0" normalizeH="0">
+          <a:defRPr kumimoji="0" sz="1800" b="0" i="0" u="none" strike="noStrike" cap="none" spc="0" normalizeH="0" baseline="0">
             <a:ln>
               <a:noFill/>
             </a:ln>
@@ -4630,7 +4827,7 @@
           <a:buFontTx/>
           <a:buNone/>
           <a:tabLst/>
-          <a:defRPr b="0" baseline="0" cap="none" i="0" spc="0" strike="noStrike" sz="1800" u="none" kumimoji="0" normalizeH="0">
+          <a:defRPr kumimoji="0" sz="1800" b="0" i="0" u="none" strike="noStrike" cap="none" spc="0" normalizeH="0" baseline="0">
             <a:ln>
               <a:noFill/>
             </a:ln>
@@ -4656,7 +4853,7 @@
           <a:buFontTx/>
           <a:buNone/>
           <a:tabLst/>
-          <a:defRPr b="0" baseline="0" cap="none" i="0" spc="0" strike="noStrike" sz="1800" u="none" kumimoji="0" normalizeH="0">
+          <a:defRPr kumimoji="0" sz="1800" b="0" i="0" u="none" strike="noStrike" cap="none" spc="0" normalizeH="0" baseline="0">
             <a:ln>
               <a:noFill/>
             </a:ln>
@@ -4682,7 +4879,7 @@
           <a:buFontTx/>
           <a:buNone/>
           <a:tabLst/>
-          <a:defRPr b="0" baseline="0" cap="none" i="0" spc="0" strike="noStrike" sz="1800" u="none" kumimoji="0" normalizeH="0">
+          <a:defRPr kumimoji="0" sz="1800" b="0" i="0" u="none" strike="noStrike" cap="none" spc="0" normalizeH="0" baseline="0">
             <a:ln>
               <a:noFill/>
             </a:ln>
@@ -4708,7 +4905,7 @@
           <a:buFontTx/>
           <a:buNone/>
           <a:tabLst/>
-          <a:defRPr b="0" baseline="0" cap="none" i="0" spc="0" strike="noStrike" sz="1800" u="none" kumimoji="0" normalizeH="0">
+          <a:defRPr kumimoji="0" sz="1800" b="0" i="0" u="none" strike="noStrike" cap="none" spc="0" normalizeH="0" baseline="0">
             <a:ln>
               <a:noFill/>
             </a:ln>
@@ -4721,9 +4918,15 @@
         </a:lvl9pPr>
       </a:lstStyle>
       <a:style>
-        <a:lnRef idx="0"/>
-        <a:fillRef idx="0"/>
-        <a:effectRef idx="0"/>
+        <a:lnRef idx="0">
+          <a:scrgbClr r="0" g="0" b="0"/>
+        </a:lnRef>
+        <a:fillRef idx="0">
+          <a:scrgbClr r="0" g="0" b="0"/>
+        </a:fillRef>
+        <a:effectRef idx="0">
+          <a:scrgbClr r="0" g="0" b="0"/>
+        </a:effectRef>
         <a:fontRef idx="none"/>
       </a:style>
     </a:spDef>
@@ -4740,7 +4943,7 @@
         <a:effectLst/>
         <a:sp3d/>
       </a:spPr>
-      <a:bodyPr rot="0" spcFirstLastPara="1" vertOverflow="overflow" horzOverflow="overflow" vert="horz" wrap="square" lIns="91439" tIns="45719" rIns="91439" bIns="45719" numCol="1" spcCol="38100" rtlCol="0" anchor="t" upright="0">
+      <a:bodyPr rot="0" spcFirstLastPara="1" vertOverflow="overflow" horzOverflow="overflow" vert="horz" wrap="square" lIns="91439" tIns="45719" rIns="91439" bIns="45719" numCol="1" spcCol="38100" rtlCol="0" anchor="t">
         <a:noAutofit/>
       </a:bodyPr>
       <a:lstStyle>
@@ -4759,7 +4962,7 @@
           <a:buFontTx/>
           <a:buNone/>
           <a:tabLst/>
-          <a:defRPr b="0" baseline="0" cap="none" i="0" spc="0" strike="noStrike" sz="1800" u="none" kumimoji="0" normalizeH="0">
+          <a:defRPr kumimoji="0" sz="1800" b="0" i="0" u="none" strike="noStrike" cap="none" spc="0" normalizeH="0" baseline="0">
             <a:ln>
               <a:noFill/>
             </a:ln>
@@ -4785,7 +4988,7 @@
           <a:buFontTx/>
           <a:buNone/>
           <a:tabLst/>
-          <a:defRPr b="0" baseline="0" cap="none" i="0" spc="0" strike="noStrike" sz="1800" u="none" kumimoji="0" normalizeH="0">
+          <a:defRPr kumimoji="0" sz="1800" b="0" i="0" u="none" strike="noStrike" cap="none" spc="0" normalizeH="0" baseline="0">
             <a:ln>
               <a:noFill/>
             </a:ln>
@@ -4811,7 +5014,7 @@
           <a:buFontTx/>
           <a:buNone/>
           <a:tabLst/>
-          <a:defRPr b="0" baseline="0" cap="none" i="0" spc="0" strike="noStrike" sz="1800" u="none" kumimoji="0" normalizeH="0">
+          <a:defRPr kumimoji="0" sz="1800" b="0" i="0" u="none" strike="noStrike" cap="none" spc="0" normalizeH="0" baseline="0">
             <a:ln>
               <a:noFill/>
             </a:ln>
@@ -4837,7 +5040,7 @@
           <a:buFontTx/>
           <a:buNone/>
           <a:tabLst/>
-          <a:defRPr b="0" baseline="0" cap="none" i="0" spc="0" strike="noStrike" sz="1800" u="none" kumimoji="0" normalizeH="0">
+          <a:defRPr kumimoji="0" sz="1800" b="0" i="0" u="none" strike="noStrike" cap="none" spc="0" normalizeH="0" baseline="0">
             <a:ln>
               <a:noFill/>
             </a:ln>
@@ -4863,7 +5066,7 @@
           <a:buFontTx/>
           <a:buNone/>
           <a:tabLst/>
-          <a:defRPr b="0" baseline="0" cap="none" i="0" spc="0" strike="noStrike" sz="1800" u="none" kumimoji="0" normalizeH="0">
+          <a:defRPr kumimoji="0" sz="1800" b="0" i="0" u="none" strike="noStrike" cap="none" spc="0" normalizeH="0" baseline="0">
             <a:ln>
               <a:noFill/>
             </a:ln>
@@ -4889,7 +5092,7 @@
           <a:buFontTx/>
           <a:buNone/>
           <a:tabLst/>
-          <a:defRPr b="0" baseline="0" cap="none" i="0" spc="0" strike="noStrike" sz="1800" u="none" kumimoji="0" normalizeH="0">
+          <a:defRPr kumimoji="0" sz="1800" b="0" i="0" u="none" strike="noStrike" cap="none" spc="0" normalizeH="0" baseline="0">
             <a:ln>
               <a:noFill/>
             </a:ln>
@@ -4915,7 +5118,7 @@
           <a:buFontTx/>
           <a:buNone/>
           <a:tabLst/>
-          <a:defRPr b="0" baseline="0" cap="none" i="0" spc="0" strike="noStrike" sz="1800" u="none" kumimoji="0" normalizeH="0">
+          <a:defRPr kumimoji="0" sz="1800" b="0" i="0" u="none" strike="noStrike" cap="none" spc="0" normalizeH="0" baseline="0">
             <a:ln>
               <a:noFill/>
             </a:ln>
@@ -4941,7 +5144,7 @@
           <a:buFontTx/>
           <a:buNone/>
           <a:tabLst/>
-          <a:defRPr b="0" baseline="0" cap="none" i="0" spc="0" strike="noStrike" sz="1800" u="none" kumimoji="0" normalizeH="0">
+          <a:defRPr kumimoji="0" sz="1800" b="0" i="0" u="none" strike="noStrike" cap="none" spc="0" normalizeH="0" baseline="0">
             <a:ln>
               <a:noFill/>
             </a:ln>
@@ -4967,7 +5170,7 @@
           <a:buFontTx/>
           <a:buNone/>
           <a:tabLst/>
-          <a:defRPr b="0" baseline="0" cap="none" i="0" spc="0" strike="noStrike" sz="1800" u="none" kumimoji="0" normalizeH="0">
+          <a:defRPr kumimoji="0" sz="1800" b="0" i="0" u="none" strike="noStrike" cap="none" spc="0" normalizeH="0" baseline="0">
             <a:ln>
               <a:noFill/>
             </a:ln>
@@ -4993,7 +5196,7 @@
           <a:buFontTx/>
           <a:buNone/>
           <a:tabLst/>
-          <a:defRPr b="0" baseline="0" cap="none" i="0" spc="0" strike="noStrike" sz="1800" u="none" kumimoji="0" normalizeH="0">
+          <a:defRPr kumimoji="0" sz="1800" b="0" i="0" u="none" strike="noStrike" cap="none" spc="0" normalizeH="0" baseline="0">
             <a:ln>
               <a:noFill/>
             </a:ln>
@@ -5006,9 +5209,15 @@
         </a:lvl9pPr>
       </a:lstStyle>
       <a:style>
-        <a:lnRef idx="0"/>
-        <a:fillRef idx="0"/>
-        <a:effectRef idx="0"/>
+        <a:lnRef idx="0">
+          <a:scrgbClr r="0" g="0" b="0"/>
+        </a:lnRef>
+        <a:fillRef idx="0">
+          <a:scrgbClr r="0" g="0" b="0"/>
+        </a:fillRef>
+        <a:effectRef idx="0">
+          <a:scrgbClr r="0" g="0" b="0"/>
+        </a:effectRef>
         <a:fontRef idx="none"/>
       </a:style>
     </a:lnDef>
@@ -5022,7 +5231,7 @@
         <a:effectLst/>
         <a:sp3d/>
       </a:spPr>
-      <a:bodyPr rot="0" spcFirstLastPara="1" vertOverflow="overflow" horzOverflow="overflow" vert="horz" wrap="square" lIns="71437" tIns="71437" rIns="71437" bIns="71437" numCol="1" spcCol="38100" rtlCol="0" anchor="ctr" upright="0">
+      <a:bodyPr rot="0" spcFirstLastPara="1" vertOverflow="overflow" horzOverflow="overflow" vert="horz" wrap="square" lIns="71437" tIns="71437" rIns="71437" bIns="71437" numCol="1" spcCol="38100" rtlCol="0" anchor="ctr">
         <a:spAutoFit/>
       </a:bodyPr>
       <a:lstStyle>
@@ -5041,7 +5250,7 @@
           <a:buFontTx/>
           <a:buNone/>
           <a:tabLst/>
-          <a:defRPr b="0" baseline="0" cap="none" i="0" spc="0" strike="noStrike" sz="5000" u="none" kumimoji="0" normalizeH="0">
+          <a:defRPr kumimoji="0" sz="5000" b="0" i="0" u="none" strike="noStrike" cap="none" spc="0" normalizeH="0" baseline="0">
             <a:ln>
               <a:noFill/>
             </a:ln>
@@ -5071,7 +5280,7 @@
           <a:buFontTx/>
           <a:buNone/>
           <a:tabLst/>
-          <a:defRPr b="0" baseline="0" cap="none" i="0" spc="0" strike="noStrike" sz="1800" u="none" kumimoji="0" normalizeH="0">
+          <a:defRPr kumimoji="0" sz="1800" b="0" i="0" u="none" strike="noStrike" cap="none" spc="0" normalizeH="0" baseline="0">
             <a:ln>
               <a:noFill/>
             </a:ln>
@@ -5097,7 +5306,7 @@
           <a:buFontTx/>
           <a:buNone/>
           <a:tabLst/>
-          <a:defRPr b="0" baseline="0" cap="none" i="0" spc="0" strike="noStrike" sz="1800" u="none" kumimoji="0" normalizeH="0">
+          <a:defRPr kumimoji="0" sz="1800" b="0" i="0" u="none" strike="noStrike" cap="none" spc="0" normalizeH="0" baseline="0">
             <a:ln>
               <a:noFill/>
             </a:ln>
@@ -5123,7 +5332,7 @@
           <a:buFontTx/>
           <a:buNone/>
           <a:tabLst/>
-          <a:defRPr b="0" baseline="0" cap="none" i="0" spc="0" strike="noStrike" sz="1800" u="none" kumimoji="0" normalizeH="0">
+          <a:defRPr kumimoji="0" sz="1800" b="0" i="0" u="none" strike="noStrike" cap="none" spc="0" normalizeH="0" baseline="0">
             <a:ln>
               <a:noFill/>
             </a:ln>
@@ -5149,7 +5358,7 @@
           <a:buFontTx/>
           <a:buNone/>
           <a:tabLst/>
-          <a:defRPr b="0" baseline="0" cap="none" i="0" spc="0" strike="noStrike" sz="1800" u="none" kumimoji="0" normalizeH="0">
+          <a:defRPr kumimoji="0" sz="1800" b="0" i="0" u="none" strike="noStrike" cap="none" spc="0" normalizeH="0" baseline="0">
             <a:ln>
               <a:noFill/>
             </a:ln>
@@ -5175,7 +5384,7 @@
           <a:buFontTx/>
           <a:buNone/>
           <a:tabLst/>
-          <a:defRPr b="0" baseline="0" cap="none" i="0" spc="0" strike="noStrike" sz="1800" u="none" kumimoji="0" normalizeH="0">
+          <a:defRPr kumimoji="0" sz="1800" b="0" i="0" u="none" strike="noStrike" cap="none" spc="0" normalizeH="0" baseline="0">
             <a:ln>
               <a:noFill/>
             </a:ln>
@@ -5201,7 +5410,7 @@
           <a:buFontTx/>
           <a:buNone/>
           <a:tabLst/>
-          <a:defRPr b="0" baseline="0" cap="none" i="0" spc="0" strike="noStrike" sz="1800" u="none" kumimoji="0" normalizeH="0">
+          <a:defRPr kumimoji="0" sz="1800" b="0" i="0" u="none" strike="noStrike" cap="none" spc="0" normalizeH="0" baseline="0">
             <a:ln>
               <a:noFill/>
             </a:ln>
@@ -5227,7 +5436,7 @@
           <a:buFontTx/>
           <a:buNone/>
           <a:tabLst/>
-          <a:defRPr b="0" baseline="0" cap="none" i="0" spc="0" strike="noStrike" sz="1800" u="none" kumimoji="0" normalizeH="0">
+          <a:defRPr kumimoji="0" sz="1800" b="0" i="0" u="none" strike="noStrike" cap="none" spc="0" normalizeH="0" baseline="0">
             <a:ln>
               <a:noFill/>
             </a:ln>
@@ -5253,7 +5462,7 @@
           <a:buFontTx/>
           <a:buNone/>
           <a:tabLst/>
-          <a:defRPr b="0" baseline="0" cap="none" i="0" spc="0" strike="noStrike" sz="1800" u="none" kumimoji="0" normalizeH="0">
+          <a:defRPr kumimoji="0" sz="1800" b="0" i="0" u="none" strike="noStrike" cap="none" spc="0" normalizeH="0" baseline="0">
             <a:ln>
               <a:noFill/>
             </a:ln>
@@ -5279,7 +5488,7 @@
           <a:buFontTx/>
           <a:buNone/>
           <a:tabLst/>
-          <a:defRPr b="0" baseline="0" cap="none" i="0" spc="0" strike="noStrike" sz="1800" u="none" kumimoji="0" normalizeH="0">
+          <a:defRPr kumimoji="0" sz="1800" b="0" i="0" u="none" strike="noStrike" cap="none" spc="0" normalizeH="0" baseline="0">
             <a:ln>
               <a:noFill/>
             </a:ln>
@@ -5292,12 +5501,25 @@
         </a:lvl9pPr>
       </a:lstStyle>
       <a:style>
-        <a:lnRef idx="0"/>
-        <a:fillRef idx="0"/>
-        <a:effectRef idx="0"/>
+        <a:lnRef idx="0">
+          <a:scrgbClr r="0" g="0" b="0"/>
+        </a:lnRef>
+        <a:fillRef idx="0">
+          <a:scrgbClr r="0" g="0" b="0"/>
+        </a:fillRef>
+        <a:effectRef idx="0">
+          <a:scrgbClr r="0" g="0" b="0"/>
+        </a:effectRef>
         <a:fontRef idx="none"/>
       </a:style>
     </a:txDef>
   </a:objectDefaults>
+  <a:extraClrSchemeLst/>
 </a:theme>
+</file>
+
+<file path=docMetadata/LabelInfo.xml><?xml version="1.0" encoding="utf-8"?>
+<clbl:labelList xmlns:clbl="http://schemas.microsoft.com/office/2020/mipLabelMetadata">
+  <clbl:label id="{f42aa342-8706-4288-bd11-ebb85995028c}" enabled="1" method="Standard" siteId="{72f988bf-86f1-41af-91ab-2d7cd011db47}" contentBits="0" removed="0"/>
+</clbl:labelList>
 </file>
</xml_diff>